<commit_message>
first stab at compressing Andres' work
</commit_message>
<xml_diff>
--- a/poster.pptx
+++ b/poster.pptx
@@ -1,21 +1,116 @@
 
 <file path=ppt/presentation.xml><?xml version="1.0" encoding="utf-8"?>
-<p:presentation xmlns:a="http://schemas.openxmlformats.org/drawingml/2006/main" xmlns:p="http://schemas.openxmlformats.org/presentationml/2006/main" xmlns:r="http://schemas.openxmlformats.org/officeDocument/2006/relationships" xmlns:p14="http://schemas.microsoft.com/office/powerpoint/2010/main" xmlns:p15="http://schemas.microsoft.com/office/powerpoint/2012/main" xmlns:mc="http://schemas.openxmlformats.org/markup-compatibility/2006">
+<p:presentation xmlns:a="http://schemas.openxmlformats.org/drawingml/2006/main" xmlns:r="http://schemas.openxmlformats.org/officeDocument/2006/relationships" xmlns:p="http://schemas.openxmlformats.org/presentationml/2006/main">
   <p:sldMasterIdLst>
-    <p:sldMasterId id="2147483648" r:id="rId2"/>
-    <p:sldMasterId id="2147483661" r:id="rId3"/>
+    <p:sldMasterId id="2147483648" r:id="rId1"/>
+    <p:sldMasterId id="2147483661" r:id="rId2"/>
   </p:sldMasterIdLst>
   <p:sldIdLst>
-    <p:sldId id="256" r:id="rId4"/>
-    <p:sldId id="257" r:id="rId5"/>
+    <p:sldId id="256" r:id="rId3"/>
+    <p:sldId id="257" r:id="rId4"/>
   </p:sldIdLst>
   <p:sldSz cx="37490400" cy="21031200"/>
   <p:notesSz cx="7772400" cy="10058400"/>
+  <p:defaultTextStyle>
+    <a:defPPr>
+      <a:defRPr lang="en-US"/>
+    </a:defPPr>
+    <a:lvl1pPr marL="0" algn="l" defTabSz="457200" rtl="0" eaLnBrk="1" latinLnBrk="0" hangingPunct="1">
+      <a:defRPr sz="1800" kern="1200">
+        <a:solidFill>
+          <a:schemeClr val="tx1"/>
+        </a:solidFill>
+        <a:latin typeface="+mn-lt"/>
+        <a:ea typeface="+mn-ea"/>
+        <a:cs typeface="+mn-cs"/>
+      </a:defRPr>
+    </a:lvl1pPr>
+    <a:lvl2pPr marL="457200" algn="l" defTabSz="457200" rtl="0" eaLnBrk="1" latinLnBrk="0" hangingPunct="1">
+      <a:defRPr sz="1800" kern="1200">
+        <a:solidFill>
+          <a:schemeClr val="tx1"/>
+        </a:solidFill>
+        <a:latin typeface="+mn-lt"/>
+        <a:ea typeface="+mn-ea"/>
+        <a:cs typeface="+mn-cs"/>
+      </a:defRPr>
+    </a:lvl2pPr>
+    <a:lvl3pPr marL="914400" algn="l" defTabSz="457200" rtl="0" eaLnBrk="1" latinLnBrk="0" hangingPunct="1">
+      <a:defRPr sz="1800" kern="1200">
+        <a:solidFill>
+          <a:schemeClr val="tx1"/>
+        </a:solidFill>
+        <a:latin typeface="+mn-lt"/>
+        <a:ea typeface="+mn-ea"/>
+        <a:cs typeface="+mn-cs"/>
+      </a:defRPr>
+    </a:lvl3pPr>
+    <a:lvl4pPr marL="1371600" algn="l" defTabSz="457200" rtl="0" eaLnBrk="1" latinLnBrk="0" hangingPunct="1">
+      <a:defRPr sz="1800" kern="1200">
+        <a:solidFill>
+          <a:schemeClr val="tx1"/>
+        </a:solidFill>
+        <a:latin typeface="+mn-lt"/>
+        <a:ea typeface="+mn-ea"/>
+        <a:cs typeface="+mn-cs"/>
+      </a:defRPr>
+    </a:lvl4pPr>
+    <a:lvl5pPr marL="1828800" algn="l" defTabSz="457200" rtl="0" eaLnBrk="1" latinLnBrk="0" hangingPunct="1">
+      <a:defRPr sz="1800" kern="1200">
+        <a:solidFill>
+          <a:schemeClr val="tx1"/>
+        </a:solidFill>
+        <a:latin typeface="+mn-lt"/>
+        <a:ea typeface="+mn-ea"/>
+        <a:cs typeface="+mn-cs"/>
+      </a:defRPr>
+    </a:lvl5pPr>
+    <a:lvl6pPr marL="2286000" algn="l" defTabSz="457200" rtl="0" eaLnBrk="1" latinLnBrk="0" hangingPunct="1">
+      <a:defRPr sz="1800" kern="1200">
+        <a:solidFill>
+          <a:schemeClr val="tx1"/>
+        </a:solidFill>
+        <a:latin typeface="+mn-lt"/>
+        <a:ea typeface="+mn-ea"/>
+        <a:cs typeface="+mn-cs"/>
+      </a:defRPr>
+    </a:lvl6pPr>
+    <a:lvl7pPr marL="2743200" algn="l" defTabSz="457200" rtl="0" eaLnBrk="1" latinLnBrk="0" hangingPunct="1">
+      <a:defRPr sz="1800" kern="1200">
+        <a:solidFill>
+          <a:schemeClr val="tx1"/>
+        </a:solidFill>
+        <a:latin typeface="+mn-lt"/>
+        <a:ea typeface="+mn-ea"/>
+        <a:cs typeface="+mn-cs"/>
+      </a:defRPr>
+    </a:lvl7pPr>
+    <a:lvl8pPr marL="3200400" algn="l" defTabSz="457200" rtl="0" eaLnBrk="1" latinLnBrk="0" hangingPunct="1">
+      <a:defRPr sz="1800" kern="1200">
+        <a:solidFill>
+          <a:schemeClr val="tx1"/>
+        </a:solidFill>
+        <a:latin typeface="+mn-lt"/>
+        <a:ea typeface="+mn-ea"/>
+        <a:cs typeface="+mn-cs"/>
+      </a:defRPr>
+    </a:lvl8pPr>
+    <a:lvl9pPr marL="3657600" algn="l" defTabSz="457200" rtl="0" eaLnBrk="1" latinLnBrk="0" hangingPunct="1">
+      <a:defRPr sz="1800" kern="1200">
+        <a:solidFill>
+          <a:schemeClr val="tx1"/>
+        </a:solidFill>
+        <a:latin typeface="+mn-lt"/>
+        <a:ea typeface="+mn-ea"/>
+        <a:cs typeface="+mn-cs"/>
+      </a:defRPr>
+    </a:lvl9pPr>
+  </p:defaultTextStyle>
 </p:presentation>
 </file>
 
 <file path=ppt/slideLayouts/slideLayout1.xml><?xml version="1.0" encoding="utf-8"?>
-<p:sldLayout xmlns:a="http://schemas.openxmlformats.org/drawingml/2006/main" xmlns:p="http://schemas.openxmlformats.org/presentationml/2006/main" xmlns:r="http://schemas.openxmlformats.org/officeDocument/2006/relationships" xmlns:p14="http://schemas.microsoft.com/office/powerpoint/2010/main" xmlns:p15="http://schemas.microsoft.com/office/powerpoint/2012/main" xmlns:mc="http://schemas.openxmlformats.org/markup-compatibility/2006" type="blank" preserve="1">
+<p:sldLayout xmlns:a="http://schemas.openxmlformats.org/drawingml/2006/main" xmlns:r="http://schemas.openxmlformats.org/officeDocument/2006/relationships" xmlns:p="http://schemas.openxmlformats.org/presentationml/2006/main" type="blank" preserve="1">
   <p:cSld name="Blank Slide">
     <p:spTree>
       <p:nvGrpSpPr>
@@ -33,11 +128,14 @@
       </p:grpSpPr>
     </p:spTree>
   </p:cSld>
+  <p:clrMapOvr>
+    <a:masterClrMapping/>
+  </p:clrMapOvr>
 </p:sldLayout>
 </file>
 
 <file path=ppt/slideLayouts/slideLayout10.xml><?xml version="1.0" encoding="utf-8"?>
-<p:sldLayout xmlns:a="http://schemas.openxmlformats.org/drawingml/2006/main" xmlns:p="http://schemas.openxmlformats.org/presentationml/2006/main" xmlns:r="http://schemas.openxmlformats.org/officeDocument/2006/relationships" xmlns:p14="http://schemas.microsoft.com/office/powerpoint/2010/main" xmlns:p15="http://schemas.microsoft.com/office/powerpoint/2012/main" xmlns:mc="http://schemas.openxmlformats.org/markup-compatibility/2006" type="objOverTx" preserve="1">
+<p:sldLayout xmlns:a="http://schemas.openxmlformats.org/drawingml/2006/main" xmlns:r="http://schemas.openxmlformats.org/officeDocument/2006/relationships" xmlns:p="http://schemas.openxmlformats.org/presentationml/2006/main" type="objOverTx" preserve="1">
   <p:cSld name="Title, Content over Content">
     <p:spTree>
       <p:nvGrpSpPr>
@@ -73,9 +171,10 @@
           </a:prstGeom>
         </p:spPr>
         <p:txBody>
-          <a:bodyPr lIns="0" rIns="0" tIns="0" bIns="0" anchor="ctr"/>
-          <a:p>
-            <a:endParaRPr b="0" lang="en-US" sz="6600" spc="-1" strike="noStrike">
+          <a:bodyPr lIns="0" tIns="0" rIns="0" bIns="0" anchor="ctr"/>
+          <a:lstStyle/>
+          <a:p>
+            <a:endParaRPr lang="en-US" sz="6600" b="0" strike="noStrike" spc="-1">
               <a:solidFill>
                 <a:srgbClr val="070707"/>
               </a:solidFill>
@@ -104,11 +203,12 @@
           </a:prstGeom>
         </p:spPr>
         <p:txBody>
-          <a:bodyPr lIns="0" rIns="0" tIns="0" bIns="0">
+          <a:bodyPr lIns="0" tIns="0" rIns="0" bIns="0">
             <a:normAutofit/>
           </a:bodyPr>
-          <a:p>
-            <a:endParaRPr b="0" lang="en-US" sz="11700" spc="-1" strike="noStrike">
+          <a:lstStyle/>
+          <a:p>
+            <a:endParaRPr lang="en-US" sz="11700" b="0" strike="noStrike" spc="-1">
               <a:solidFill>
                 <a:srgbClr val="070707"/>
               </a:solidFill>
@@ -137,11 +237,12 @@
           </a:prstGeom>
         </p:spPr>
         <p:txBody>
-          <a:bodyPr lIns="0" rIns="0" tIns="0" bIns="0">
+          <a:bodyPr lIns="0" tIns="0" rIns="0" bIns="0">
             <a:normAutofit/>
           </a:bodyPr>
-          <a:p>
-            <a:endParaRPr b="0" lang="en-US" sz="11700" spc="-1" strike="noStrike">
+          <a:lstStyle/>
+          <a:p>
+            <a:endParaRPr lang="en-US" sz="11700" b="0" strike="noStrike" spc="-1">
               <a:solidFill>
                 <a:srgbClr val="070707"/>
               </a:solidFill>
@@ -152,11 +253,14 @@
       </p:sp>
     </p:spTree>
   </p:cSld>
+  <p:clrMapOvr>
+    <a:masterClrMapping/>
+  </p:clrMapOvr>
 </p:sldLayout>
 </file>
 
 <file path=ppt/slideLayouts/slideLayout11.xml><?xml version="1.0" encoding="utf-8"?>
-<p:sldLayout xmlns:a="http://schemas.openxmlformats.org/drawingml/2006/main" xmlns:p="http://schemas.openxmlformats.org/presentationml/2006/main" xmlns:r="http://schemas.openxmlformats.org/officeDocument/2006/relationships" xmlns:p14="http://schemas.microsoft.com/office/powerpoint/2010/main" xmlns:p15="http://schemas.microsoft.com/office/powerpoint/2012/main" xmlns:mc="http://schemas.openxmlformats.org/markup-compatibility/2006" type="fourObj" preserve="1">
+<p:sldLayout xmlns:a="http://schemas.openxmlformats.org/drawingml/2006/main" xmlns:r="http://schemas.openxmlformats.org/officeDocument/2006/relationships" xmlns:p="http://schemas.openxmlformats.org/presentationml/2006/main" type="fourObj" preserve="1">
   <p:cSld name="Title, 4 Content">
     <p:spTree>
       <p:nvGrpSpPr>
@@ -192,9 +296,10 @@
           </a:prstGeom>
         </p:spPr>
         <p:txBody>
-          <a:bodyPr lIns="0" rIns="0" tIns="0" bIns="0" anchor="ctr"/>
-          <a:p>
-            <a:endParaRPr b="0" lang="en-US" sz="6600" spc="-1" strike="noStrike">
+          <a:bodyPr lIns="0" tIns="0" rIns="0" bIns="0" anchor="ctr"/>
+          <a:lstStyle/>
+          <a:p>
+            <a:endParaRPr lang="en-US" sz="6600" b="0" strike="noStrike" spc="-1">
               <a:solidFill>
                 <a:srgbClr val="070707"/>
               </a:solidFill>
@@ -223,11 +328,12 @@
           </a:prstGeom>
         </p:spPr>
         <p:txBody>
-          <a:bodyPr lIns="0" rIns="0" tIns="0" bIns="0">
+          <a:bodyPr lIns="0" tIns="0" rIns="0" bIns="0">
             <a:normAutofit/>
           </a:bodyPr>
-          <a:p>
-            <a:endParaRPr b="0" lang="en-US" sz="11700" spc="-1" strike="noStrike">
+          <a:lstStyle/>
+          <a:p>
+            <a:endParaRPr lang="en-US" sz="11700" b="0" strike="noStrike" spc="-1">
               <a:solidFill>
                 <a:srgbClr val="070707"/>
               </a:solidFill>
@@ -256,11 +362,12 @@
           </a:prstGeom>
         </p:spPr>
         <p:txBody>
-          <a:bodyPr lIns="0" rIns="0" tIns="0" bIns="0">
+          <a:bodyPr lIns="0" tIns="0" rIns="0" bIns="0">
             <a:normAutofit/>
           </a:bodyPr>
-          <a:p>
-            <a:endParaRPr b="0" lang="en-US" sz="11700" spc="-1" strike="noStrike">
+          <a:lstStyle/>
+          <a:p>
+            <a:endParaRPr lang="en-US" sz="11700" b="0" strike="noStrike" spc="-1">
               <a:solidFill>
                 <a:srgbClr val="070707"/>
               </a:solidFill>
@@ -289,11 +396,12 @@
           </a:prstGeom>
         </p:spPr>
         <p:txBody>
-          <a:bodyPr lIns="0" rIns="0" tIns="0" bIns="0">
+          <a:bodyPr lIns="0" tIns="0" rIns="0" bIns="0">
             <a:normAutofit/>
           </a:bodyPr>
-          <a:p>
-            <a:endParaRPr b="0" lang="en-US" sz="11700" spc="-1" strike="noStrike">
+          <a:lstStyle/>
+          <a:p>
+            <a:endParaRPr lang="en-US" sz="11700" b="0" strike="noStrike" spc="-1">
               <a:solidFill>
                 <a:srgbClr val="070707"/>
               </a:solidFill>
@@ -322,11 +430,12 @@
           </a:prstGeom>
         </p:spPr>
         <p:txBody>
-          <a:bodyPr lIns="0" rIns="0" tIns="0" bIns="0">
+          <a:bodyPr lIns="0" tIns="0" rIns="0" bIns="0">
             <a:normAutofit/>
           </a:bodyPr>
-          <a:p>
-            <a:endParaRPr b="0" lang="en-US" sz="11700" spc="-1" strike="noStrike">
+          <a:lstStyle/>
+          <a:p>
+            <a:endParaRPr lang="en-US" sz="11700" b="0" strike="noStrike" spc="-1">
               <a:solidFill>
                 <a:srgbClr val="070707"/>
               </a:solidFill>
@@ -337,11 +446,14 @@
       </p:sp>
     </p:spTree>
   </p:cSld>
+  <p:clrMapOvr>
+    <a:masterClrMapping/>
+  </p:clrMapOvr>
 </p:sldLayout>
 </file>
 
 <file path=ppt/slideLayouts/slideLayout12.xml><?xml version="1.0" encoding="utf-8"?>
-<p:sldLayout xmlns:a="http://schemas.openxmlformats.org/drawingml/2006/main" xmlns:p="http://schemas.openxmlformats.org/presentationml/2006/main" xmlns:r="http://schemas.openxmlformats.org/officeDocument/2006/relationships" xmlns:p14="http://schemas.microsoft.com/office/powerpoint/2010/main" xmlns:p15="http://schemas.microsoft.com/office/powerpoint/2012/main" xmlns:mc="http://schemas.openxmlformats.org/markup-compatibility/2006" type="blank" preserve="1">
+<p:sldLayout xmlns:a="http://schemas.openxmlformats.org/drawingml/2006/main" xmlns:r="http://schemas.openxmlformats.org/officeDocument/2006/relationships" xmlns:p="http://schemas.openxmlformats.org/presentationml/2006/main" type="blank" preserve="1">
   <p:cSld name="Title, 6 Content">
     <p:spTree>
       <p:nvGrpSpPr>
@@ -377,9 +489,10 @@
           </a:prstGeom>
         </p:spPr>
         <p:txBody>
-          <a:bodyPr lIns="0" rIns="0" tIns="0" bIns="0" anchor="ctr"/>
-          <a:p>
-            <a:endParaRPr b="0" lang="en-US" sz="6600" spc="-1" strike="noStrike">
+          <a:bodyPr lIns="0" tIns="0" rIns="0" bIns="0" anchor="ctr"/>
+          <a:lstStyle/>
+          <a:p>
+            <a:endParaRPr lang="en-US" sz="6600" b="0" strike="noStrike" spc="-1">
               <a:solidFill>
                 <a:srgbClr val="070707"/>
               </a:solidFill>
@@ -408,11 +521,12 @@
           </a:prstGeom>
         </p:spPr>
         <p:txBody>
-          <a:bodyPr lIns="0" rIns="0" tIns="0" bIns="0">
+          <a:bodyPr lIns="0" tIns="0" rIns="0" bIns="0">
             <a:normAutofit/>
           </a:bodyPr>
-          <a:p>
-            <a:endParaRPr b="0" lang="en-US" sz="11700" spc="-1" strike="noStrike">
+          <a:lstStyle/>
+          <a:p>
+            <a:endParaRPr lang="en-US" sz="11700" b="0" strike="noStrike" spc="-1">
               <a:solidFill>
                 <a:srgbClr val="070707"/>
               </a:solidFill>
@@ -441,11 +555,12 @@
           </a:prstGeom>
         </p:spPr>
         <p:txBody>
-          <a:bodyPr lIns="0" rIns="0" tIns="0" bIns="0">
+          <a:bodyPr lIns="0" tIns="0" rIns="0" bIns="0">
             <a:normAutofit/>
           </a:bodyPr>
-          <a:p>
-            <a:endParaRPr b="0" lang="en-US" sz="11700" spc="-1" strike="noStrike">
+          <a:lstStyle/>
+          <a:p>
+            <a:endParaRPr lang="en-US" sz="11700" b="0" strike="noStrike" spc="-1">
               <a:solidFill>
                 <a:srgbClr val="070707"/>
               </a:solidFill>
@@ -474,11 +589,12 @@
           </a:prstGeom>
         </p:spPr>
         <p:txBody>
-          <a:bodyPr lIns="0" rIns="0" tIns="0" bIns="0">
+          <a:bodyPr lIns="0" tIns="0" rIns="0" bIns="0">
             <a:normAutofit/>
           </a:bodyPr>
-          <a:p>
-            <a:endParaRPr b="0" lang="en-US" sz="11700" spc="-1" strike="noStrike">
+          <a:lstStyle/>
+          <a:p>
+            <a:endParaRPr lang="en-US" sz="11700" b="0" strike="noStrike" spc="-1">
               <a:solidFill>
                 <a:srgbClr val="070707"/>
               </a:solidFill>
@@ -507,11 +623,12 @@
           </a:prstGeom>
         </p:spPr>
         <p:txBody>
-          <a:bodyPr lIns="0" rIns="0" tIns="0" bIns="0">
+          <a:bodyPr lIns="0" tIns="0" rIns="0" bIns="0">
             <a:normAutofit/>
           </a:bodyPr>
-          <a:p>
-            <a:endParaRPr b="0" lang="en-US" sz="11700" spc="-1" strike="noStrike">
+          <a:lstStyle/>
+          <a:p>
+            <a:endParaRPr lang="en-US" sz="11700" b="0" strike="noStrike" spc="-1">
               <a:solidFill>
                 <a:srgbClr val="070707"/>
               </a:solidFill>
@@ -540,11 +657,12 @@
           </a:prstGeom>
         </p:spPr>
         <p:txBody>
-          <a:bodyPr lIns="0" rIns="0" tIns="0" bIns="0">
+          <a:bodyPr lIns="0" tIns="0" rIns="0" bIns="0">
             <a:normAutofit/>
           </a:bodyPr>
-          <a:p>
-            <a:endParaRPr b="0" lang="en-US" sz="11700" spc="-1" strike="noStrike">
+          <a:lstStyle/>
+          <a:p>
+            <a:endParaRPr lang="en-US" sz="11700" b="0" strike="noStrike" spc="-1">
               <a:solidFill>
                 <a:srgbClr val="070707"/>
               </a:solidFill>
@@ -573,11 +691,12 @@
           </a:prstGeom>
         </p:spPr>
         <p:txBody>
-          <a:bodyPr lIns="0" rIns="0" tIns="0" bIns="0">
+          <a:bodyPr lIns="0" tIns="0" rIns="0" bIns="0">
             <a:normAutofit/>
           </a:bodyPr>
-          <a:p>
-            <a:endParaRPr b="0" lang="en-US" sz="11700" spc="-1" strike="noStrike">
+          <a:lstStyle/>
+          <a:p>
+            <a:endParaRPr lang="en-US" sz="11700" b="0" strike="noStrike" spc="-1">
               <a:solidFill>
                 <a:srgbClr val="070707"/>
               </a:solidFill>
@@ -588,11 +707,14 @@
       </p:sp>
     </p:spTree>
   </p:cSld>
+  <p:clrMapOvr>
+    <a:masterClrMapping/>
+  </p:clrMapOvr>
 </p:sldLayout>
 </file>
 
 <file path=ppt/slideLayouts/slideLayout13.xml><?xml version="1.0" encoding="utf-8"?>
-<p:sldLayout xmlns:a="http://schemas.openxmlformats.org/drawingml/2006/main" xmlns:p="http://schemas.openxmlformats.org/presentationml/2006/main" xmlns:r="http://schemas.openxmlformats.org/officeDocument/2006/relationships" xmlns:p14="http://schemas.microsoft.com/office/powerpoint/2010/main" xmlns:p15="http://schemas.microsoft.com/office/powerpoint/2012/main" xmlns:mc="http://schemas.openxmlformats.org/markup-compatibility/2006" type="blank" preserve="1">
+<p:sldLayout xmlns:a="http://schemas.openxmlformats.org/drawingml/2006/main" xmlns:r="http://schemas.openxmlformats.org/officeDocument/2006/relationships" xmlns:p="http://schemas.openxmlformats.org/presentationml/2006/main" type="blank" preserve="1">
   <p:cSld name="Blank Slide">
     <p:spTree>
       <p:nvGrpSpPr>
@@ -610,11 +732,14 @@
       </p:grpSpPr>
     </p:spTree>
   </p:cSld>
+  <p:clrMapOvr>
+    <a:masterClrMapping/>
+  </p:clrMapOvr>
 </p:sldLayout>
 </file>
 
 <file path=ppt/slideLayouts/slideLayout14.xml><?xml version="1.0" encoding="utf-8"?>
-<p:sldLayout xmlns:a="http://schemas.openxmlformats.org/drawingml/2006/main" xmlns:p="http://schemas.openxmlformats.org/presentationml/2006/main" xmlns:r="http://schemas.openxmlformats.org/officeDocument/2006/relationships" xmlns:p14="http://schemas.microsoft.com/office/powerpoint/2010/main" xmlns:p15="http://schemas.microsoft.com/office/powerpoint/2012/main" xmlns:mc="http://schemas.openxmlformats.org/markup-compatibility/2006" type="tx" preserve="1">
+<p:sldLayout xmlns:a="http://schemas.openxmlformats.org/drawingml/2006/main" xmlns:r="http://schemas.openxmlformats.org/officeDocument/2006/relationships" xmlns:p="http://schemas.openxmlformats.org/presentationml/2006/main" type="tx" preserve="1">
   <p:cSld name="Title Slide">
     <p:spTree>
       <p:nvGrpSpPr>
@@ -650,9 +775,10 @@
           </a:prstGeom>
         </p:spPr>
         <p:txBody>
-          <a:bodyPr lIns="0" rIns="0" tIns="0" bIns="0" anchor="ctr"/>
-          <a:p>
-            <a:endParaRPr b="0" lang="en-US" sz="6600" spc="-1" strike="noStrike">
+          <a:bodyPr lIns="0" tIns="0" rIns="0" bIns="0" anchor="ctr"/>
+          <a:lstStyle/>
+          <a:p>
+            <a:endParaRPr lang="en-US" sz="6600" b="0" strike="noStrike" spc="-1">
               <a:solidFill>
                 <a:srgbClr val="070707"/>
               </a:solidFill>
@@ -681,10 +807,11 @@
           </a:prstGeom>
         </p:spPr>
         <p:txBody>
-          <a:bodyPr lIns="0" rIns="0" tIns="0" bIns="0" anchor="ctr"/>
+          <a:bodyPr lIns="0" tIns="0" rIns="0" bIns="0" anchor="ctr"/>
+          <a:lstStyle/>
           <a:p>
             <a:pPr algn="ctr"/>
-            <a:endParaRPr b="0" lang="en-US" sz="3200" spc="-1" strike="noStrike">
+            <a:endParaRPr lang="en-US" sz="3200" b="0" strike="noStrike" spc="-1">
               <a:latin typeface="Arial"/>
             </a:endParaRPr>
           </a:p>
@@ -692,11 +819,14 @@
       </p:sp>
     </p:spTree>
   </p:cSld>
+  <p:clrMapOvr>
+    <a:masterClrMapping/>
+  </p:clrMapOvr>
 </p:sldLayout>
 </file>
 
 <file path=ppt/slideLayouts/slideLayout15.xml><?xml version="1.0" encoding="utf-8"?>
-<p:sldLayout xmlns:a="http://schemas.openxmlformats.org/drawingml/2006/main" xmlns:p="http://schemas.openxmlformats.org/presentationml/2006/main" xmlns:r="http://schemas.openxmlformats.org/officeDocument/2006/relationships" xmlns:p14="http://schemas.microsoft.com/office/powerpoint/2010/main" xmlns:p15="http://schemas.microsoft.com/office/powerpoint/2012/main" xmlns:mc="http://schemas.openxmlformats.org/markup-compatibility/2006" type="obj" preserve="1">
+<p:sldLayout xmlns:a="http://schemas.openxmlformats.org/drawingml/2006/main" xmlns:r="http://schemas.openxmlformats.org/officeDocument/2006/relationships" xmlns:p="http://schemas.openxmlformats.org/presentationml/2006/main" type="obj" preserve="1">
   <p:cSld name="Title, Content">
     <p:spTree>
       <p:nvGrpSpPr>
@@ -732,9 +862,10 @@
           </a:prstGeom>
         </p:spPr>
         <p:txBody>
-          <a:bodyPr lIns="0" rIns="0" tIns="0" bIns="0" anchor="ctr"/>
-          <a:p>
-            <a:endParaRPr b="0" lang="en-US" sz="6600" spc="-1" strike="noStrike">
+          <a:bodyPr lIns="0" tIns="0" rIns="0" bIns="0" anchor="ctr"/>
+          <a:lstStyle/>
+          <a:p>
+            <a:endParaRPr lang="en-US" sz="6600" b="0" strike="noStrike" spc="-1">
               <a:solidFill>
                 <a:srgbClr val="070707"/>
               </a:solidFill>
@@ -763,11 +894,12 @@
           </a:prstGeom>
         </p:spPr>
         <p:txBody>
-          <a:bodyPr lIns="0" rIns="0" tIns="0" bIns="0">
+          <a:bodyPr lIns="0" tIns="0" rIns="0" bIns="0">
             <a:normAutofit/>
           </a:bodyPr>
-          <a:p>
-            <a:endParaRPr b="0" lang="en-US" sz="11700" spc="-1" strike="noStrike">
+          <a:lstStyle/>
+          <a:p>
+            <a:endParaRPr lang="en-US" sz="11700" b="0" strike="noStrike" spc="-1">
               <a:solidFill>
                 <a:srgbClr val="070707"/>
               </a:solidFill>
@@ -778,11 +910,14 @@
       </p:sp>
     </p:spTree>
   </p:cSld>
+  <p:clrMapOvr>
+    <a:masterClrMapping/>
+  </p:clrMapOvr>
 </p:sldLayout>
 </file>
 
 <file path=ppt/slideLayouts/slideLayout16.xml><?xml version="1.0" encoding="utf-8"?>
-<p:sldLayout xmlns:a="http://schemas.openxmlformats.org/drawingml/2006/main" xmlns:p="http://schemas.openxmlformats.org/presentationml/2006/main" xmlns:r="http://schemas.openxmlformats.org/officeDocument/2006/relationships" xmlns:p14="http://schemas.microsoft.com/office/powerpoint/2010/main" xmlns:p15="http://schemas.microsoft.com/office/powerpoint/2012/main" xmlns:mc="http://schemas.openxmlformats.org/markup-compatibility/2006" type="twoObj" preserve="1">
+<p:sldLayout xmlns:a="http://schemas.openxmlformats.org/drawingml/2006/main" xmlns:r="http://schemas.openxmlformats.org/officeDocument/2006/relationships" xmlns:p="http://schemas.openxmlformats.org/presentationml/2006/main" type="twoObj" preserve="1">
   <p:cSld name="Title, 2 Content">
     <p:spTree>
       <p:nvGrpSpPr>
@@ -818,9 +953,10 @@
           </a:prstGeom>
         </p:spPr>
         <p:txBody>
-          <a:bodyPr lIns="0" rIns="0" tIns="0" bIns="0" anchor="ctr"/>
-          <a:p>
-            <a:endParaRPr b="0" lang="en-US" sz="6600" spc="-1" strike="noStrike">
+          <a:bodyPr lIns="0" tIns="0" rIns="0" bIns="0" anchor="ctr"/>
+          <a:lstStyle/>
+          <a:p>
+            <a:endParaRPr lang="en-US" sz="6600" b="0" strike="noStrike" spc="-1">
               <a:solidFill>
                 <a:srgbClr val="070707"/>
               </a:solidFill>
@@ -849,11 +985,12 @@
           </a:prstGeom>
         </p:spPr>
         <p:txBody>
-          <a:bodyPr lIns="0" rIns="0" tIns="0" bIns="0">
+          <a:bodyPr lIns="0" tIns="0" rIns="0" bIns="0">
             <a:normAutofit/>
           </a:bodyPr>
-          <a:p>
-            <a:endParaRPr b="0" lang="en-US" sz="11700" spc="-1" strike="noStrike">
+          <a:lstStyle/>
+          <a:p>
+            <a:endParaRPr lang="en-US" sz="11700" b="0" strike="noStrike" spc="-1">
               <a:solidFill>
                 <a:srgbClr val="070707"/>
               </a:solidFill>
@@ -882,11 +1019,12 @@
           </a:prstGeom>
         </p:spPr>
         <p:txBody>
-          <a:bodyPr lIns="0" rIns="0" tIns="0" bIns="0">
+          <a:bodyPr lIns="0" tIns="0" rIns="0" bIns="0">
             <a:normAutofit/>
           </a:bodyPr>
-          <a:p>
-            <a:endParaRPr b="0" lang="en-US" sz="11700" spc="-1" strike="noStrike">
+          <a:lstStyle/>
+          <a:p>
+            <a:endParaRPr lang="en-US" sz="11700" b="0" strike="noStrike" spc="-1">
               <a:solidFill>
                 <a:srgbClr val="070707"/>
               </a:solidFill>
@@ -897,11 +1035,14 @@
       </p:sp>
     </p:spTree>
   </p:cSld>
+  <p:clrMapOvr>
+    <a:masterClrMapping/>
+  </p:clrMapOvr>
 </p:sldLayout>
 </file>
 
 <file path=ppt/slideLayouts/slideLayout17.xml><?xml version="1.0" encoding="utf-8"?>
-<p:sldLayout xmlns:a="http://schemas.openxmlformats.org/drawingml/2006/main" xmlns:p="http://schemas.openxmlformats.org/presentationml/2006/main" xmlns:r="http://schemas.openxmlformats.org/officeDocument/2006/relationships" xmlns:p14="http://schemas.microsoft.com/office/powerpoint/2010/main" xmlns:p15="http://schemas.microsoft.com/office/powerpoint/2012/main" xmlns:mc="http://schemas.openxmlformats.org/markup-compatibility/2006" type="titleOnly" preserve="1">
+<p:sldLayout xmlns:a="http://schemas.openxmlformats.org/drawingml/2006/main" xmlns:r="http://schemas.openxmlformats.org/officeDocument/2006/relationships" xmlns:p="http://schemas.openxmlformats.org/presentationml/2006/main" type="titleOnly" preserve="1">
   <p:cSld name="Title Only">
     <p:spTree>
       <p:nvGrpSpPr>
@@ -937,9 +1078,10 @@
           </a:prstGeom>
         </p:spPr>
         <p:txBody>
-          <a:bodyPr lIns="0" rIns="0" tIns="0" bIns="0" anchor="ctr"/>
-          <a:p>
-            <a:endParaRPr b="0" lang="en-US" sz="6600" spc="-1" strike="noStrike">
+          <a:bodyPr lIns="0" tIns="0" rIns="0" bIns="0" anchor="ctr"/>
+          <a:lstStyle/>
+          <a:p>
+            <a:endParaRPr lang="en-US" sz="6600" b="0" strike="noStrike" spc="-1">
               <a:solidFill>
                 <a:srgbClr val="070707"/>
               </a:solidFill>
@@ -950,11 +1092,14 @@
       </p:sp>
     </p:spTree>
   </p:cSld>
+  <p:clrMapOvr>
+    <a:masterClrMapping/>
+  </p:clrMapOvr>
 </p:sldLayout>
 </file>
 
 <file path=ppt/slideLayouts/slideLayout18.xml><?xml version="1.0" encoding="utf-8"?>
-<p:sldLayout xmlns:a="http://schemas.openxmlformats.org/drawingml/2006/main" xmlns:p="http://schemas.openxmlformats.org/presentationml/2006/main" xmlns:r="http://schemas.openxmlformats.org/officeDocument/2006/relationships" xmlns:p14="http://schemas.microsoft.com/office/powerpoint/2010/main" xmlns:p15="http://schemas.microsoft.com/office/powerpoint/2012/main" xmlns:mc="http://schemas.openxmlformats.org/markup-compatibility/2006" type="objOnly" preserve="1">
+<p:sldLayout xmlns:a="http://schemas.openxmlformats.org/drawingml/2006/main" xmlns:r="http://schemas.openxmlformats.org/officeDocument/2006/relationships" xmlns:p="http://schemas.openxmlformats.org/presentationml/2006/main" type="objOnly" preserve="1">
   <p:cSld name="Centered Text">
     <p:spTree>
       <p:nvGrpSpPr>
@@ -990,10 +1135,11 @@
           </a:prstGeom>
         </p:spPr>
         <p:txBody>
-          <a:bodyPr lIns="0" rIns="0" tIns="0" bIns="0" anchor="ctr"/>
+          <a:bodyPr lIns="0" tIns="0" rIns="0" bIns="0" anchor="ctr"/>
+          <a:lstStyle/>
           <a:p>
             <a:pPr algn="ctr"/>
-            <a:endParaRPr b="0" lang="en-US" sz="3200" spc="-1" strike="noStrike">
+            <a:endParaRPr lang="en-US" sz="3200" b="0" strike="noStrike" spc="-1">
               <a:latin typeface="Arial"/>
             </a:endParaRPr>
           </a:p>
@@ -1001,11 +1147,14 @@
       </p:sp>
     </p:spTree>
   </p:cSld>
+  <p:clrMapOvr>
+    <a:masterClrMapping/>
+  </p:clrMapOvr>
 </p:sldLayout>
 </file>
 
 <file path=ppt/slideLayouts/slideLayout19.xml><?xml version="1.0" encoding="utf-8"?>
-<p:sldLayout xmlns:a="http://schemas.openxmlformats.org/drawingml/2006/main" xmlns:p="http://schemas.openxmlformats.org/presentationml/2006/main" xmlns:r="http://schemas.openxmlformats.org/officeDocument/2006/relationships" xmlns:p14="http://schemas.microsoft.com/office/powerpoint/2010/main" xmlns:p15="http://schemas.microsoft.com/office/powerpoint/2012/main" xmlns:mc="http://schemas.openxmlformats.org/markup-compatibility/2006" type="twoObjAndObj" preserve="1">
+<p:sldLayout xmlns:a="http://schemas.openxmlformats.org/drawingml/2006/main" xmlns:r="http://schemas.openxmlformats.org/officeDocument/2006/relationships" xmlns:p="http://schemas.openxmlformats.org/presentationml/2006/main" type="twoObjAndObj" preserve="1">
   <p:cSld name="Title, 2 Content and Content">
     <p:spTree>
       <p:nvGrpSpPr>
@@ -1041,9 +1190,10 @@
           </a:prstGeom>
         </p:spPr>
         <p:txBody>
-          <a:bodyPr lIns="0" rIns="0" tIns="0" bIns="0" anchor="ctr"/>
-          <a:p>
-            <a:endParaRPr b="0" lang="en-US" sz="6600" spc="-1" strike="noStrike">
+          <a:bodyPr lIns="0" tIns="0" rIns="0" bIns="0" anchor="ctr"/>
+          <a:lstStyle/>
+          <a:p>
+            <a:endParaRPr lang="en-US" sz="6600" b="0" strike="noStrike" spc="-1">
               <a:solidFill>
                 <a:srgbClr val="070707"/>
               </a:solidFill>
@@ -1072,11 +1222,12 @@
           </a:prstGeom>
         </p:spPr>
         <p:txBody>
-          <a:bodyPr lIns="0" rIns="0" tIns="0" bIns="0">
+          <a:bodyPr lIns="0" tIns="0" rIns="0" bIns="0">
             <a:normAutofit/>
           </a:bodyPr>
-          <a:p>
-            <a:endParaRPr b="0" lang="en-US" sz="11700" spc="-1" strike="noStrike">
+          <a:lstStyle/>
+          <a:p>
+            <a:endParaRPr lang="en-US" sz="11700" b="0" strike="noStrike" spc="-1">
               <a:solidFill>
                 <a:srgbClr val="070707"/>
               </a:solidFill>
@@ -1105,11 +1256,12 @@
           </a:prstGeom>
         </p:spPr>
         <p:txBody>
-          <a:bodyPr lIns="0" rIns="0" tIns="0" bIns="0">
+          <a:bodyPr lIns="0" tIns="0" rIns="0" bIns="0">
             <a:normAutofit/>
           </a:bodyPr>
-          <a:p>
-            <a:endParaRPr b="0" lang="en-US" sz="11700" spc="-1" strike="noStrike">
+          <a:lstStyle/>
+          <a:p>
+            <a:endParaRPr lang="en-US" sz="11700" b="0" strike="noStrike" spc="-1">
               <a:solidFill>
                 <a:srgbClr val="070707"/>
               </a:solidFill>
@@ -1138,11 +1290,12 @@
           </a:prstGeom>
         </p:spPr>
         <p:txBody>
-          <a:bodyPr lIns="0" rIns="0" tIns="0" bIns="0">
+          <a:bodyPr lIns="0" tIns="0" rIns="0" bIns="0">
             <a:normAutofit/>
           </a:bodyPr>
-          <a:p>
-            <a:endParaRPr b="0" lang="en-US" sz="11700" spc="-1" strike="noStrike">
+          <a:lstStyle/>
+          <a:p>
+            <a:endParaRPr lang="en-US" sz="11700" b="0" strike="noStrike" spc="-1">
               <a:solidFill>
                 <a:srgbClr val="070707"/>
               </a:solidFill>
@@ -1153,11 +1306,14 @@
       </p:sp>
     </p:spTree>
   </p:cSld>
+  <p:clrMapOvr>
+    <a:masterClrMapping/>
+  </p:clrMapOvr>
 </p:sldLayout>
 </file>
 
 <file path=ppt/slideLayouts/slideLayout2.xml><?xml version="1.0" encoding="utf-8"?>
-<p:sldLayout xmlns:a="http://schemas.openxmlformats.org/drawingml/2006/main" xmlns:p="http://schemas.openxmlformats.org/presentationml/2006/main" xmlns:r="http://schemas.openxmlformats.org/officeDocument/2006/relationships" xmlns:p14="http://schemas.microsoft.com/office/powerpoint/2010/main" xmlns:p15="http://schemas.microsoft.com/office/powerpoint/2012/main" xmlns:mc="http://schemas.openxmlformats.org/markup-compatibility/2006" type="tx" preserve="1">
+<p:sldLayout xmlns:a="http://schemas.openxmlformats.org/drawingml/2006/main" xmlns:r="http://schemas.openxmlformats.org/officeDocument/2006/relationships" xmlns:p="http://schemas.openxmlformats.org/presentationml/2006/main" type="tx" preserve="1">
   <p:cSld name="Title Slide">
     <p:spTree>
       <p:nvGrpSpPr>
@@ -1193,9 +1349,10 @@
           </a:prstGeom>
         </p:spPr>
         <p:txBody>
-          <a:bodyPr lIns="0" rIns="0" tIns="0" bIns="0" anchor="ctr"/>
-          <a:p>
-            <a:endParaRPr b="0" lang="en-US" sz="6600" spc="-1" strike="noStrike">
+          <a:bodyPr lIns="0" tIns="0" rIns="0" bIns="0" anchor="ctr"/>
+          <a:lstStyle/>
+          <a:p>
+            <a:endParaRPr lang="en-US" sz="6600" b="0" strike="noStrike" spc="-1">
               <a:solidFill>
                 <a:srgbClr val="070707"/>
               </a:solidFill>
@@ -1224,10 +1381,11 @@
           </a:prstGeom>
         </p:spPr>
         <p:txBody>
-          <a:bodyPr lIns="0" rIns="0" tIns="0" bIns="0" anchor="ctr"/>
+          <a:bodyPr lIns="0" tIns="0" rIns="0" bIns="0" anchor="ctr"/>
+          <a:lstStyle/>
           <a:p>
             <a:pPr algn="ctr"/>
-            <a:endParaRPr b="0" lang="en-US" sz="3200" spc="-1" strike="noStrike">
+            <a:endParaRPr lang="en-US" sz="3200" b="0" strike="noStrike" spc="-1">
               <a:latin typeface="Arial"/>
             </a:endParaRPr>
           </a:p>
@@ -1235,11 +1393,14 @@
       </p:sp>
     </p:spTree>
   </p:cSld>
+  <p:clrMapOvr>
+    <a:masterClrMapping/>
+  </p:clrMapOvr>
 </p:sldLayout>
 </file>
 
 <file path=ppt/slideLayouts/slideLayout20.xml><?xml version="1.0" encoding="utf-8"?>
-<p:sldLayout xmlns:a="http://schemas.openxmlformats.org/drawingml/2006/main" xmlns:p="http://schemas.openxmlformats.org/presentationml/2006/main" xmlns:r="http://schemas.openxmlformats.org/officeDocument/2006/relationships" xmlns:p14="http://schemas.microsoft.com/office/powerpoint/2010/main" xmlns:p15="http://schemas.microsoft.com/office/powerpoint/2012/main" xmlns:mc="http://schemas.openxmlformats.org/markup-compatibility/2006" type="objAndTwoObj" preserve="1">
+<p:sldLayout xmlns:a="http://schemas.openxmlformats.org/drawingml/2006/main" xmlns:r="http://schemas.openxmlformats.org/officeDocument/2006/relationships" xmlns:p="http://schemas.openxmlformats.org/presentationml/2006/main" type="objAndTwoObj" preserve="1">
   <p:cSld name="Title Content and 2 Content">
     <p:spTree>
       <p:nvGrpSpPr>
@@ -1275,9 +1436,10 @@
           </a:prstGeom>
         </p:spPr>
         <p:txBody>
-          <a:bodyPr lIns="0" rIns="0" tIns="0" bIns="0" anchor="ctr"/>
-          <a:p>
-            <a:endParaRPr b="0" lang="en-US" sz="6600" spc="-1" strike="noStrike">
+          <a:bodyPr lIns="0" tIns="0" rIns="0" bIns="0" anchor="ctr"/>
+          <a:lstStyle/>
+          <a:p>
+            <a:endParaRPr lang="en-US" sz="6600" b="0" strike="noStrike" spc="-1">
               <a:solidFill>
                 <a:srgbClr val="070707"/>
               </a:solidFill>
@@ -1306,11 +1468,12 @@
           </a:prstGeom>
         </p:spPr>
         <p:txBody>
-          <a:bodyPr lIns="0" rIns="0" tIns="0" bIns="0">
+          <a:bodyPr lIns="0" tIns="0" rIns="0" bIns="0">
             <a:normAutofit/>
           </a:bodyPr>
-          <a:p>
-            <a:endParaRPr b="0" lang="en-US" sz="11700" spc="-1" strike="noStrike">
+          <a:lstStyle/>
+          <a:p>
+            <a:endParaRPr lang="en-US" sz="11700" b="0" strike="noStrike" spc="-1">
               <a:solidFill>
                 <a:srgbClr val="070707"/>
               </a:solidFill>
@@ -1339,11 +1502,12 @@
           </a:prstGeom>
         </p:spPr>
         <p:txBody>
-          <a:bodyPr lIns="0" rIns="0" tIns="0" bIns="0">
+          <a:bodyPr lIns="0" tIns="0" rIns="0" bIns="0">
             <a:normAutofit/>
           </a:bodyPr>
-          <a:p>
-            <a:endParaRPr b="0" lang="en-US" sz="11700" spc="-1" strike="noStrike">
+          <a:lstStyle/>
+          <a:p>
+            <a:endParaRPr lang="en-US" sz="11700" b="0" strike="noStrike" spc="-1">
               <a:solidFill>
                 <a:srgbClr val="070707"/>
               </a:solidFill>
@@ -1372,11 +1536,12 @@
           </a:prstGeom>
         </p:spPr>
         <p:txBody>
-          <a:bodyPr lIns="0" rIns="0" tIns="0" bIns="0">
+          <a:bodyPr lIns="0" tIns="0" rIns="0" bIns="0">
             <a:normAutofit/>
           </a:bodyPr>
-          <a:p>
-            <a:endParaRPr b="0" lang="en-US" sz="11700" spc="-1" strike="noStrike">
+          <a:lstStyle/>
+          <a:p>
+            <a:endParaRPr lang="en-US" sz="11700" b="0" strike="noStrike" spc="-1">
               <a:solidFill>
                 <a:srgbClr val="070707"/>
               </a:solidFill>
@@ -1387,11 +1552,14 @@
       </p:sp>
     </p:spTree>
   </p:cSld>
+  <p:clrMapOvr>
+    <a:masterClrMapping/>
+  </p:clrMapOvr>
 </p:sldLayout>
 </file>
 
 <file path=ppt/slideLayouts/slideLayout21.xml><?xml version="1.0" encoding="utf-8"?>
-<p:sldLayout xmlns:a="http://schemas.openxmlformats.org/drawingml/2006/main" xmlns:p="http://schemas.openxmlformats.org/presentationml/2006/main" xmlns:r="http://schemas.openxmlformats.org/officeDocument/2006/relationships" xmlns:p14="http://schemas.microsoft.com/office/powerpoint/2010/main" xmlns:p15="http://schemas.microsoft.com/office/powerpoint/2012/main" xmlns:mc="http://schemas.openxmlformats.org/markup-compatibility/2006" type="twoObjOverTx" preserve="1">
+<p:sldLayout xmlns:a="http://schemas.openxmlformats.org/drawingml/2006/main" xmlns:r="http://schemas.openxmlformats.org/officeDocument/2006/relationships" xmlns:p="http://schemas.openxmlformats.org/presentationml/2006/main" type="twoObjOverTx" preserve="1">
   <p:cSld name="Title, 2 Content over Content">
     <p:spTree>
       <p:nvGrpSpPr>
@@ -1427,9 +1595,10 @@
           </a:prstGeom>
         </p:spPr>
         <p:txBody>
-          <a:bodyPr lIns="0" rIns="0" tIns="0" bIns="0" anchor="ctr"/>
-          <a:p>
-            <a:endParaRPr b="0" lang="en-US" sz="6600" spc="-1" strike="noStrike">
+          <a:bodyPr lIns="0" tIns="0" rIns="0" bIns="0" anchor="ctr"/>
+          <a:lstStyle/>
+          <a:p>
+            <a:endParaRPr lang="en-US" sz="6600" b="0" strike="noStrike" spc="-1">
               <a:solidFill>
                 <a:srgbClr val="070707"/>
               </a:solidFill>
@@ -1458,11 +1627,12 @@
           </a:prstGeom>
         </p:spPr>
         <p:txBody>
-          <a:bodyPr lIns="0" rIns="0" tIns="0" bIns="0">
+          <a:bodyPr lIns="0" tIns="0" rIns="0" bIns="0">
             <a:normAutofit/>
           </a:bodyPr>
-          <a:p>
-            <a:endParaRPr b="0" lang="en-US" sz="11700" spc="-1" strike="noStrike">
+          <a:lstStyle/>
+          <a:p>
+            <a:endParaRPr lang="en-US" sz="11700" b="0" strike="noStrike" spc="-1">
               <a:solidFill>
                 <a:srgbClr val="070707"/>
               </a:solidFill>
@@ -1491,11 +1661,12 @@
           </a:prstGeom>
         </p:spPr>
         <p:txBody>
-          <a:bodyPr lIns="0" rIns="0" tIns="0" bIns="0">
+          <a:bodyPr lIns="0" tIns="0" rIns="0" bIns="0">
             <a:normAutofit/>
           </a:bodyPr>
-          <a:p>
-            <a:endParaRPr b="0" lang="en-US" sz="11700" spc="-1" strike="noStrike">
+          <a:lstStyle/>
+          <a:p>
+            <a:endParaRPr lang="en-US" sz="11700" b="0" strike="noStrike" spc="-1">
               <a:solidFill>
                 <a:srgbClr val="070707"/>
               </a:solidFill>
@@ -1524,11 +1695,12 @@
           </a:prstGeom>
         </p:spPr>
         <p:txBody>
-          <a:bodyPr lIns="0" rIns="0" tIns="0" bIns="0">
+          <a:bodyPr lIns="0" tIns="0" rIns="0" bIns="0">
             <a:normAutofit/>
           </a:bodyPr>
-          <a:p>
-            <a:endParaRPr b="0" lang="en-US" sz="11700" spc="-1" strike="noStrike">
+          <a:lstStyle/>
+          <a:p>
+            <a:endParaRPr lang="en-US" sz="11700" b="0" strike="noStrike" spc="-1">
               <a:solidFill>
                 <a:srgbClr val="070707"/>
               </a:solidFill>
@@ -1539,11 +1711,14 @@
       </p:sp>
     </p:spTree>
   </p:cSld>
+  <p:clrMapOvr>
+    <a:masterClrMapping/>
+  </p:clrMapOvr>
 </p:sldLayout>
 </file>
 
 <file path=ppt/slideLayouts/slideLayout22.xml><?xml version="1.0" encoding="utf-8"?>
-<p:sldLayout xmlns:a="http://schemas.openxmlformats.org/drawingml/2006/main" xmlns:p="http://schemas.openxmlformats.org/presentationml/2006/main" xmlns:r="http://schemas.openxmlformats.org/officeDocument/2006/relationships" xmlns:p14="http://schemas.microsoft.com/office/powerpoint/2010/main" xmlns:p15="http://schemas.microsoft.com/office/powerpoint/2012/main" xmlns:mc="http://schemas.openxmlformats.org/markup-compatibility/2006" type="objOverTx" preserve="1">
+<p:sldLayout xmlns:a="http://schemas.openxmlformats.org/drawingml/2006/main" xmlns:r="http://schemas.openxmlformats.org/officeDocument/2006/relationships" xmlns:p="http://schemas.openxmlformats.org/presentationml/2006/main" type="objOverTx" preserve="1">
   <p:cSld name="Title, Content over Content">
     <p:spTree>
       <p:nvGrpSpPr>
@@ -1579,9 +1754,10 @@
           </a:prstGeom>
         </p:spPr>
         <p:txBody>
-          <a:bodyPr lIns="0" rIns="0" tIns="0" bIns="0" anchor="ctr"/>
-          <a:p>
-            <a:endParaRPr b="0" lang="en-US" sz="6600" spc="-1" strike="noStrike">
+          <a:bodyPr lIns="0" tIns="0" rIns="0" bIns="0" anchor="ctr"/>
+          <a:lstStyle/>
+          <a:p>
+            <a:endParaRPr lang="en-US" sz="6600" b="0" strike="noStrike" spc="-1">
               <a:solidFill>
                 <a:srgbClr val="070707"/>
               </a:solidFill>
@@ -1610,11 +1786,12 @@
           </a:prstGeom>
         </p:spPr>
         <p:txBody>
-          <a:bodyPr lIns="0" rIns="0" tIns="0" bIns="0">
+          <a:bodyPr lIns="0" tIns="0" rIns="0" bIns="0">
             <a:normAutofit/>
           </a:bodyPr>
-          <a:p>
-            <a:endParaRPr b="0" lang="en-US" sz="11700" spc="-1" strike="noStrike">
+          <a:lstStyle/>
+          <a:p>
+            <a:endParaRPr lang="en-US" sz="11700" b="0" strike="noStrike" spc="-1">
               <a:solidFill>
                 <a:srgbClr val="070707"/>
               </a:solidFill>
@@ -1643,11 +1820,12 @@
           </a:prstGeom>
         </p:spPr>
         <p:txBody>
-          <a:bodyPr lIns="0" rIns="0" tIns="0" bIns="0">
+          <a:bodyPr lIns="0" tIns="0" rIns="0" bIns="0">
             <a:normAutofit/>
           </a:bodyPr>
-          <a:p>
-            <a:endParaRPr b="0" lang="en-US" sz="11700" spc="-1" strike="noStrike">
+          <a:lstStyle/>
+          <a:p>
+            <a:endParaRPr lang="en-US" sz="11700" b="0" strike="noStrike" spc="-1">
               <a:solidFill>
                 <a:srgbClr val="070707"/>
               </a:solidFill>
@@ -1658,11 +1836,14 @@
       </p:sp>
     </p:spTree>
   </p:cSld>
+  <p:clrMapOvr>
+    <a:masterClrMapping/>
+  </p:clrMapOvr>
 </p:sldLayout>
 </file>
 
 <file path=ppt/slideLayouts/slideLayout23.xml><?xml version="1.0" encoding="utf-8"?>
-<p:sldLayout xmlns:a="http://schemas.openxmlformats.org/drawingml/2006/main" xmlns:p="http://schemas.openxmlformats.org/presentationml/2006/main" xmlns:r="http://schemas.openxmlformats.org/officeDocument/2006/relationships" xmlns:p14="http://schemas.microsoft.com/office/powerpoint/2010/main" xmlns:p15="http://schemas.microsoft.com/office/powerpoint/2012/main" xmlns:mc="http://schemas.openxmlformats.org/markup-compatibility/2006" type="fourObj" preserve="1">
+<p:sldLayout xmlns:a="http://schemas.openxmlformats.org/drawingml/2006/main" xmlns:r="http://schemas.openxmlformats.org/officeDocument/2006/relationships" xmlns:p="http://schemas.openxmlformats.org/presentationml/2006/main" type="fourObj" preserve="1">
   <p:cSld name="Title, 4 Content">
     <p:spTree>
       <p:nvGrpSpPr>
@@ -1698,9 +1879,10 @@
           </a:prstGeom>
         </p:spPr>
         <p:txBody>
-          <a:bodyPr lIns="0" rIns="0" tIns="0" bIns="0" anchor="ctr"/>
-          <a:p>
-            <a:endParaRPr b="0" lang="en-US" sz="6600" spc="-1" strike="noStrike">
+          <a:bodyPr lIns="0" tIns="0" rIns="0" bIns="0" anchor="ctr"/>
+          <a:lstStyle/>
+          <a:p>
+            <a:endParaRPr lang="en-US" sz="6600" b="0" strike="noStrike" spc="-1">
               <a:solidFill>
                 <a:srgbClr val="070707"/>
               </a:solidFill>
@@ -1729,11 +1911,12 @@
           </a:prstGeom>
         </p:spPr>
         <p:txBody>
-          <a:bodyPr lIns="0" rIns="0" tIns="0" bIns="0">
+          <a:bodyPr lIns="0" tIns="0" rIns="0" bIns="0">
             <a:normAutofit/>
           </a:bodyPr>
-          <a:p>
-            <a:endParaRPr b="0" lang="en-US" sz="11700" spc="-1" strike="noStrike">
+          <a:lstStyle/>
+          <a:p>
+            <a:endParaRPr lang="en-US" sz="11700" b="0" strike="noStrike" spc="-1">
               <a:solidFill>
                 <a:srgbClr val="070707"/>
               </a:solidFill>
@@ -1762,11 +1945,12 @@
           </a:prstGeom>
         </p:spPr>
         <p:txBody>
-          <a:bodyPr lIns="0" rIns="0" tIns="0" bIns="0">
+          <a:bodyPr lIns="0" tIns="0" rIns="0" bIns="0">
             <a:normAutofit/>
           </a:bodyPr>
-          <a:p>
-            <a:endParaRPr b="0" lang="en-US" sz="11700" spc="-1" strike="noStrike">
+          <a:lstStyle/>
+          <a:p>
+            <a:endParaRPr lang="en-US" sz="11700" b="0" strike="noStrike" spc="-1">
               <a:solidFill>
                 <a:srgbClr val="070707"/>
               </a:solidFill>
@@ -1795,11 +1979,12 @@
           </a:prstGeom>
         </p:spPr>
         <p:txBody>
-          <a:bodyPr lIns="0" rIns="0" tIns="0" bIns="0">
+          <a:bodyPr lIns="0" tIns="0" rIns="0" bIns="0">
             <a:normAutofit/>
           </a:bodyPr>
-          <a:p>
-            <a:endParaRPr b="0" lang="en-US" sz="11700" spc="-1" strike="noStrike">
+          <a:lstStyle/>
+          <a:p>
+            <a:endParaRPr lang="en-US" sz="11700" b="0" strike="noStrike" spc="-1">
               <a:solidFill>
                 <a:srgbClr val="070707"/>
               </a:solidFill>
@@ -1828,11 +2013,12 @@
           </a:prstGeom>
         </p:spPr>
         <p:txBody>
-          <a:bodyPr lIns="0" rIns="0" tIns="0" bIns="0">
+          <a:bodyPr lIns="0" tIns="0" rIns="0" bIns="0">
             <a:normAutofit/>
           </a:bodyPr>
-          <a:p>
-            <a:endParaRPr b="0" lang="en-US" sz="11700" spc="-1" strike="noStrike">
+          <a:lstStyle/>
+          <a:p>
+            <a:endParaRPr lang="en-US" sz="11700" b="0" strike="noStrike" spc="-1">
               <a:solidFill>
                 <a:srgbClr val="070707"/>
               </a:solidFill>
@@ -1843,11 +2029,14 @@
       </p:sp>
     </p:spTree>
   </p:cSld>
+  <p:clrMapOvr>
+    <a:masterClrMapping/>
+  </p:clrMapOvr>
 </p:sldLayout>
 </file>
 
 <file path=ppt/slideLayouts/slideLayout24.xml><?xml version="1.0" encoding="utf-8"?>
-<p:sldLayout xmlns:a="http://schemas.openxmlformats.org/drawingml/2006/main" xmlns:p="http://schemas.openxmlformats.org/presentationml/2006/main" xmlns:r="http://schemas.openxmlformats.org/officeDocument/2006/relationships" xmlns:p14="http://schemas.microsoft.com/office/powerpoint/2010/main" xmlns:p15="http://schemas.microsoft.com/office/powerpoint/2012/main" xmlns:mc="http://schemas.openxmlformats.org/markup-compatibility/2006" type="blank" preserve="1">
+<p:sldLayout xmlns:a="http://schemas.openxmlformats.org/drawingml/2006/main" xmlns:r="http://schemas.openxmlformats.org/officeDocument/2006/relationships" xmlns:p="http://schemas.openxmlformats.org/presentationml/2006/main" type="blank" preserve="1">
   <p:cSld name="Title, 6 Content">
     <p:spTree>
       <p:nvGrpSpPr>
@@ -1883,9 +2072,10 @@
           </a:prstGeom>
         </p:spPr>
         <p:txBody>
-          <a:bodyPr lIns="0" rIns="0" tIns="0" bIns="0" anchor="ctr"/>
-          <a:p>
-            <a:endParaRPr b="0" lang="en-US" sz="6600" spc="-1" strike="noStrike">
+          <a:bodyPr lIns="0" tIns="0" rIns="0" bIns="0" anchor="ctr"/>
+          <a:lstStyle/>
+          <a:p>
+            <a:endParaRPr lang="en-US" sz="6600" b="0" strike="noStrike" spc="-1">
               <a:solidFill>
                 <a:srgbClr val="070707"/>
               </a:solidFill>
@@ -1914,11 +2104,12 @@
           </a:prstGeom>
         </p:spPr>
         <p:txBody>
-          <a:bodyPr lIns="0" rIns="0" tIns="0" bIns="0">
+          <a:bodyPr lIns="0" tIns="0" rIns="0" bIns="0">
             <a:normAutofit/>
           </a:bodyPr>
-          <a:p>
-            <a:endParaRPr b="0" lang="en-US" sz="11700" spc="-1" strike="noStrike">
+          <a:lstStyle/>
+          <a:p>
+            <a:endParaRPr lang="en-US" sz="11700" b="0" strike="noStrike" spc="-1">
               <a:solidFill>
                 <a:srgbClr val="070707"/>
               </a:solidFill>
@@ -1947,11 +2138,12 @@
           </a:prstGeom>
         </p:spPr>
         <p:txBody>
-          <a:bodyPr lIns="0" rIns="0" tIns="0" bIns="0">
+          <a:bodyPr lIns="0" tIns="0" rIns="0" bIns="0">
             <a:normAutofit/>
           </a:bodyPr>
-          <a:p>
-            <a:endParaRPr b="0" lang="en-US" sz="11700" spc="-1" strike="noStrike">
+          <a:lstStyle/>
+          <a:p>
+            <a:endParaRPr lang="en-US" sz="11700" b="0" strike="noStrike" spc="-1">
               <a:solidFill>
                 <a:srgbClr val="070707"/>
               </a:solidFill>
@@ -1980,11 +2172,12 @@
           </a:prstGeom>
         </p:spPr>
         <p:txBody>
-          <a:bodyPr lIns="0" rIns="0" tIns="0" bIns="0">
+          <a:bodyPr lIns="0" tIns="0" rIns="0" bIns="0">
             <a:normAutofit/>
           </a:bodyPr>
-          <a:p>
-            <a:endParaRPr b="0" lang="en-US" sz="11700" spc="-1" strike="noStrike">
+          <a:lstStyle/>
+          <a:p>
+            <a:endParaRPr lang="en-US" sz="11700" b="0" strike="noStrike" spc="-1">
               <a:solidFill>
                 <a:srgbClr val="070707"/>
               </a:solidFill>
@@ -2013,11 +2206,12 @@
           </a:prstGeom>
         </p:spPr>
         <p:txBody>
-          <a:bodyPr lIns="0" rIns="0" tIns="0" bIns="0">
+          <a:bodyPr lIns="0" tIns="0" rIns="0" bIns="0">
             <a:normAutofit/>
           </a:bodyPr>
-          <a:p>
-            <a:endParaRPr b="0" lang="en-US" sz="11700" spc="-1" strike="noStrike">
+          <a:lstStyle/>
+          <a:p>
+            <a:endParaRPr lang="en-US" sz="11700" b="0" strike="noStrike" spc="-1">
               <a:solidFill>
                 <a:srgbClr val="070707"/>
               </a:solidFill>
@@ -2046,11 +2240,12 @@
           </a:prstGeom>
         </p:spPr>
         <p:txBody>
-          <a:bodyPr lIns="0" rIns="0" tIns="0" bIns="0">
+          <a:bodyPr lIns="0" tIns="0" rIns="0" bIns="0">
             <a:normAutofit/>
           </a:bodyPr>
-          <a:p>
-            <a:endParaRPr b="0" lang="en-US" sz="11700" spc="-1" strike="noStrike">
+          <a:lstStyle/>
+          <a:p>
+            <a:endParaRPr lang="en-US" sz="11700" b="0" strike="noStrike" spc="-1">
               <a:solidFill>
                 <a:srgbClr val="070707"/>
               </a:solidFill>
@@ -2079,11 +2274,12 @@
           </a:prstGeom>
         </p:spPr>
         <p:txBody>
-          <a:bodyPr lIns="0" rIns="0" tIns="0" bIns="0">
+          <a:bodyPr lIns="0" tIns="0" rIns="0" bIns="0">
             <a:normAutofit/>
           </a:bodyPr>
-          <a:p>
-            <a:endParaRPr b="0" lang="en-US" sz="11700" spc="-1" strike="noStrike">
+          <a:lstStyle/>
+          <a:p>
+            <a:endParaRPr lang="en-US" sz="11700" b="0" strike="noStrike" spc="-1">
               <a:solidFill>
                 <a:srgbClr val="070707"/>
               </a:solidFill>
@@ -2094,11 +2290,14 @@
       </p:sp>
     </p:spTree>
   </p:cSld>
+  <p:clrMapOvr>
+    <a:masterClrMapping/>
+  </p:clrMapOvr>
 </p:sldLayout>
 </file>
 
 <file path=ppt/slideLayouts/slideLayout3.xml><?xml version="1.0" encoding="utf-8"?>
-<p:sldLayout xmlns:a="http://schemas.openxmlformats.org/drawingml/2006/main" xmlns:p="http://schemas.openxmlformats.org/presentationml/2006/main" xmlns:r="http://schemas.openxmlformats.org/officeDocument/2006/relationships" xmlns:p14="http://schemas.microsoft.com/office/powerpoint/2010/main" xmlns:p15="http://schemas.microsoft.com/office/powerpoint/2012/main" xmlns:mc="http://schemas.openxmlformats.org/markup-compatibility/2006" type="obj" preserve="1">
+<p:sldLayout xmlns:a="http://schemas.openxmlformats.org/drawingml/2006/main" xmlns:r="http://schemas.openxmlformats.org/officeDocument/2006/relationships" xmlns:p="http://schemas.openxmlformats.org/presentationml/2006/main" type="obj" preserve="1">
   <p:cSld name="Title, Content">
     <p:spTree>
       <p:nvGrpSpPr>
@@ -2134,9 +2333,10 @@
           </a:prstGeom>
         </p:spPr>
         <p:txBody>
-          <a:bodyPr lIns="0" rIns="0" tIns="0" bIns="0" anchor="ctr"/>
-          <a:p>
-            <a:endParaRPr b="0" lang="en-US" sz="6600" spc="-1" strike="noStrike">
+          <a:bodyPr lIns="0" tIns="0" rIns="0" bIns="0" anchor="ctr"/>
+          <a:lstStyle/>
+          <a:p>
+            <a:endParaRPr lang="en-US" sz="6600" b="0" strike="noStrike" spc="-1">
               <a:solidFill>
                 <a:srgbClr val="070707"/>
               </a:solidFill>
@@ -2165,11 +2365,12 @@
           </a:prstGeom>
         </p:spPr>
         <p:txBody>
-          <a:bodyPr lIns="0" rIns="0" tIns="0" bIns="0">
+          <a:bodyPr lIns="0" tIns="0" rIns="0" bIns="0">
             <a:normAutofit/>
           </a:bodyPr>
-          <a:p>
-            <a:endParaRPr b="0" lang="en-US" sz="11700" spc="-1" strike="noStrike">
+          <a:lstStyle/>
+          <a:p>
+            <a:endParaRPr lang="en-US" sz="11700" b="0" strike="noStrike" spc="-1">
               <a:solidFill>
                 <a:srgbClr val="070707"/>
               </a:solidFill>
@@ -2180,11 +2381,14 @@
       </p:sp>
     </p:spTree>
   </p:cSld>
+  <p:clrMapOvr>
+    <a:masterClrMapping/>
+  </p:clrMapOvr>
 </p:sldLayout>
 </file>
 
 <file path=ppt/slideLayouts/slideLayout4.xml><?xml version="1.0" encoding="utf-8"?>
-<p:sldLayout xmlns:a="http://schemas.openxmlformats.org/drawingml/2006/main" xmlns:p="http://schemas.openxmlformats.org/presentationml/2006/main" xmlns:r="http://schemas.openxmlformats.org/officeDocument/2006/relationships" xmlns:p14="http://schemas.microsoft.com/office/powerpoint/2010/main" xmlns:p15="http://schemas.microsoft.com/office/powerpoint/2012/main" xmlns:mc="http://schemas.openxmlformats.org/markup-compatibility/2006" type="twoObj" preserve="1">
+<p:sldLayout xmlns:a="http://schemas.openxmlformats.org/drawingml/2006/main" xmlns:r="http://schemas.openxmlformats.org/officeDocument/2006/relationships" xmlns:p="http://schemas.openxmlformats.org/presentationml/2006/main" type="twoObj" preserve="1">
   <p:cSld name="Title, 2 Content">
     <p:spTree>
       <p:nvGrpSpPr>
@@ -2220,9 +2424,10 @@
           </a:prstGeom>
         </p:spPr>
         <p:txBody>
-          <a:bodyPr lIns="0" rIns="0" tIns="0" bIns="0" anchor="ctr"/>
-          <a:p>
-            <a:endParaRPr b="0" lang="en-US" sz="6600" spc="-1" strike="noStrike">
+          <a:bodyPr lIns="0" tIns="0" rIns="0" bIns="0" anchor="ctr"/>
+          <a:lstStyle/>
+          <a:p>
+            <a:endParaRPr lang="en-US" sz="6600" b="0" strike="noStrike" spc="-1">
               <a:solidFill>
                 <a:srgbClr val="070707"/>
               </a:solidFill>
@@ -2251,11 +2456,12 @@
           </a:prstGeom>
         </p:spPr>
         <p:txBody>
-          <a:bodyPr lIns="0" rIns="0" tIns="0" bIns="0">
+          <a:bodyPr lIns="0" tIns="0" rIns="0" bIns="0">
             <a:normAutofit/>
           </a:bodyPr>
-          <a:p>
-            <a:endParaRPr b="0" lang="en-US" sz="11700" spc="-1" strike="noStrike">
+          <a:lstStyle/>
+          <a:p>
+            <a:endParaRPr lang="en-US" sz="11700" b="0" strike="noStrike" spc="-1">
               <a:solidFill>
                 <a:srgbClr val="070707"/>
               </a:solidFill>
@@ -2284,11 +2490,12 @@
           </a:prstGeom>
         </p:spPr>
         <p:txBody>
-          <a:bodyPr lIns="0" rIns="0" tIns="0" bIns="0">
+          <a:bodyPr lIns="0" tIns="0" rIns="0" bIns="0">
             <a:normAutofit/>
           </a:bodyPr>
-          <a:p>
-            <a:endParaRPr b="0" lang="en-US" sz="11700" spc="-1" strike="noStrike">
+          <a:lstStyle/>
+          <a:p>
+            <a:endParaRPr lang="en-US" sz="11700" b="0" strike="noStrike" spc="-1">
               <a:solidFill>
                 <a:srgbClr val="070707"/>
               </a:solidFill>
@@ -2299,11 +2506,14 @@
       </p:sp>
     </p:spTree>
   </p:cSld>
+  <p:clrMapOvr>
+    <a:masterClrMapping/>
+  </p:clrMapOvr>
 </p:sldLayout>
 </file>
 
 <file path=ppt/slideLayouts/slideLayout5.xml><?xml version="1.0" encoding="utf-8"?>
-<p:sldLayout xmlns:a="http://schemas.openxmlformats.org/drawingml/2006/main" xmlns:p="http://schemas.openxmlformats.org/presentationml/2006/main" xmlns:r="http://schemas.openxmlformats.org/officeDocument/2006/relationships" xmlns:p14="http://schemas.microsoft.com/office/powerpoint/2010/main" xmlns:p15="http://schemas.microsoft.com/office/powerpoint/2012/main" xmlns:mc="http://schemas.openxmlformats.org/markup-compatibility/2006" type="titleOnly" preserve="1">
+<p:sldLayout xmlns:a="http://schemas.openxmlformats.org/drawingml/2006/main" xmlns:r="http://schemas.openxmlformats.org/officeDocument/2006/relationships" xmlns:p="http://schemas.openxmlformats.org/presentationml/2006/main" type="titleOnly" preserve="1">
   <p:cSld name="Title Only">
     <p:spTree>
       <p:nvGrpSpPr>
@@ -2339,9 +2549,10 @@
           </a:prstGeom>
         </p:spPr>
         <p:txBody>
-          <a:bodyPr lIns="0" rIns="0" tIns="0" bIns="0" anchor="ctr"/>
-          <a:p>
-            <a:endParaRPr b="0" lang="en-US" sz="6600" spc="-1" strike="noStrike">
+          <a:bodyPr lIns="0" tIns="0" rIns="0" bIns="0" anchor="ctr"/>
+          <a:lstStyle/>
+          <a:p>
+            <a:endParaRPr lang="en-US" sz="6600" b="0" strike="noStrike" spc="-1">
               <a:solidFill>
                 <a:srgbClr val="070707"/>
               </a:solidFill>
@@ -2352,11 +2563,14 @@
       </p:sp>
     </p:spTree>
   </p:cSld>
+  <p:clrMapOvr>
+    <a:masterClrMapping/>
+  </p:clrMapOvr>
 </p:sldLayout>
 </file>
 
 <file path=ppt/slideLayouts/slideLayout6.xml><?xml version="1.0" encoding="utf-8"?>
-<p:sldLayout xmlns:a="http://schemas.openxmlformats.org/drawingml/2006/main" xmlns:p="http://schemas.openxmlformats.org/presentationml/2006/main" xmlns:r="http://schemas.openxmlformats.org/officeDocument/2006/relationships" xmlns:p14="http://schemas.microsoft.com/office/powerpoint/2010/main" xmlns:p15="http://schemas.microsoft.com/office/powerpoint/2012/main" xmlns:mc="http://schemas.openxmlformats.org/markup-compatibility/2006" type="objOnly" preserve="1">
+<p:sldLayout xmlns:a="http://schemas.openxmlformats.org/drawingml/2006/main" xmlns:r="http://schemas.openxmlformats.org/officeDocument/2006/relationships" xmlns:p="http://schemas.openxmlformats.org/presentationml/2006/main" type="objOnly" preserve="1">
   <p:cSld name="Centered Text">
     <p:spTree>
       <p:nvGrpSpPr>
@@ -2392,10 +2606,11 @@
           </a:prstGeom>
         </p:spPr>
         <p:txBody>
-          <a:bodyPr lIns="0" rIns="0" tIns="0" bIns="0" anchor="ctr"/>
+          <a:bodyPr lIns="0" tIns="0" rIns="0" bIns="0" anchor="ctr"/>
+          <a:lstStyle/>
           <a:p>
             <a:pPr algn="ctr"/>
-            <a:endParaRPr b="0" lang="en-US" sz="3200" spc="-1" strike="noStrike">
+            <a:endParaRPr lang="en-US" sz="3200" b="0" strike="noStrike" spc="-1">
               <a:latin typeface="Arial"/>
             </a:endParaRPr>
           </a:p>
@@ -2403,11 +2618,14 @@
       </p:sp>
     </p:spTree>
   </p:cSld>
+  <p:clrMapOvr>
+    <a:masterClrMapping/>
+  </p:clrMapOvr>
 </p:sldLayout>
 </file>
 
 <file path=ppt/slideLayouts/slideLayout7.xml><?xml version="1.0" encoding="utf-8"?>
-<p:sldLayout xmlns:a="http://schemas.openxmlformats.org/drawingml/2006/main" xmlns:p="http://schemas.openxmlformats.org/presentationml/2006/main" xmlns:r="http://schemas.openxmlformats.org/officeDocument/2006/relationships" xmlns:p14="http://schemas.microsoft.com/office/powerpoint/2010/main" xmlns:p15="http://schemas.microsoft.com/office/powerpoint/2012/main" xmlns:mc="http://schemas.openxmlformats.org/markup-compatibility/2006" type="twoObjAndObj" preserve="1">
+<p:sldLayout xmlns:a="http://schemas.openxmlformats.org/drawingml/2006/main" xmlns:r="http://schemas.openxmlformats.org/officeDocument/2006/relationships" xmlns:p="http://schemas.openxmlformats.org/presentationml/2006/main" type="twoObjAndObj" preserve="1">
   <p:cSld name="Title, 2 Content and Content">
     <p:spTree>
       <p:nvGrpSpPr>
@@ -2443,9 +2661,10 @@
           </a:prstGeom>
         </p:spPr>
         <p:txBody>
-          <a:bodyPr lIns="0" rIns="0" tIns="0" bIns="0" anchor="ctr"/>
-          <a:p>
-            <a:endParaRPr b="0" lang="en-US" sz="6600" spc="-1" strike="noStrike">
+          <a:bodyPr lIns="0" tIns="0" rIns="0" bIns="0" anchor="ctr"/>
+          <a:lstStyle/>
+          <a:p>
+            <a:endParaRPr lang="en-US" sz="6600" b="0" strike="noStrike" spc="-1">
               <a:solidFill>
                 <a:srgbClr val="070707"/>
               </a:solidFill>
@@ -2474,11 +2693,12 @@
           </a:prstGeom>
         </p:spPr>
         <p:txBody>
-          <a:bodyPr lIns="0" rIns="0" tIns="0" bIns="0">
+          <a:bodyPr lIns="0" tIns="0" rIns="0" bIns="0">
             <a:normAutofit/>
           </a:bodyPr>
-          <a:p>
-            <a:endParaRPr b="0" lang="en-US" sz="11700" spc="-1" strike="noStrike">
+          <a:lstStyle/>
+          <a:p>
+            <a:endParaRPr lang="en-US" sz="11700" b="0" strike="noStrike" spc="-1">
               <a:solidFill>
                 <a:srgbClr val="070707"/>
               </a:solidFill>
@@ -2507,11 +2727,12 @@
           </a:prstGeom>
         </p:spPr>
         <p:txBody>
-          <a:bodyPr lIns="0" rIns="0" tIns="0" bIns="0">
+          <a:bodyPr lIns="0" tIns="0" rIns="0" bIns="0">
             <a:normAutofit/>
           </a:bodyPr>
-          <a:p>
-            <a:endParaRPr b="0" lang="en-US" sz="11700" spc="-1" strike="noStrike">
+          <a:lstStyle/>
+          <a:p>
+            <a:endParaRPr lang="en-US" sz="11700" b="0" strike="noStrike" spc="-1">
               <a:solidFill>
                 <a:srgbClr val="070707"/>
               </a:solidFill>
@@ -2540,11 +2761,12 @@
           </a:prstGeom>
         </p:spPr>
         <p:txBody>
-          <a:bodyPr lIns="0" rIns="0" tIns="0" bIns="0">
+          <a:bodyPr lIns="0" tIns="0" rIns="0" bIns="0">
             <a:normAutofit/>
           </a:bodyPr>
-          <a:p>
-            <a:endParaRPr b="0" lang="en-US" sz="11700" spc="-1" strike="noStrike">
+          <a:lstStyle/>
+          <a:p>
+            <a:endParaRPr lang="en-US" sz="11700" b="0" strike="noStrike" spc="-1">
               <a:solidFill>
                 <a:srgbClr val="070707"/>
               </a:solidFill>
@@ -2555,11 +2777,14 @@
       </p:sp>
     </p:spTree>
   </p:cSld>
+  <p:clrMapOvr>
+    <a:masterClrMapping/>
+  </p:clrMapOvr>
 </p:sldLayout>
 </file>
 
 <file path=ppt/slideLayouts/slideLayout8.xml><?xml version="1.0" encoding="utf-8"?>
-<p:sldLayout xmlns:a="http://schemas.openxmlformats.org/drawingml/2006/main" xmlns:p="http://schemas.openxmlformats.org/presentationml/2006/main" xmlns:r="http://schemas.openxmlformats.org/officeDocument/2006/relationships" xmlns:p14="http://schemas.microsoft.com/office/powerpoint/2010/main" xmlns:p15="http://schemas.microsoft.com/office/powerpoint/2012/main" xmlns:mc="http://schemas.openxmlformats.org/markup-compatibility/2006" type="objAndTwoObj" preserve="1">
+<p:sldLayout xmlns:a="http://schemas.openxmlformats.org/drawingml/2006/main" xmlns:r="http://schemas.openxmlformats.org/officeDocument/2006/relationships" xmlns:p="http://schemas.openxmlformats.org/presentationml/2006/main" type="objAndTwoObj" preserve="1">
   <p:cSld name="Title Content and 2 Content">
     <p:spTree>
       <p:nvGrpSpPr>
@@ -2595,9 +2820,10 @@
           </a:prstGeom>
         </p:spPr>
         <p:txBody>
-          <a:bodyPr lIns="0" rIns="0" tIns="0" bIns="0" anchor="ctr"/>
-          <a:p>
-            <a:endParaRPr b="0" lang="en-US" sz="6600" spc="-1" strike="noStrike">
+          <a:bodyPr lIns="0" tIns="0" rIns="0" bIns="0" anchor="ctr"/>
+          <a:lstStyle/>
+          <a:p>
+            <a:endParaRPr lang="en-US" sz="6600" b="0" strike="noStrike" spc="-1">
               <a:solidFill>
                 <a:srgbClr val="070707"/>
               </a:solidFill>
@@ -2626,11 +2852,12 @@
           </a:prstGeom>
         </p:spPr>
         <p:txBody>
-          <a:bodyPr lIns="0" rIns="0" tIns="0" bIns="0">
+          <a:bodyPr lIns="0" tIns="0" rIns="0" bIns="0">
             <a:normAutofit/>
           </a:bodyPr>
-          <a:p>
-            <a:endParaRPr b="0" lang="en-US" sz="11700" spc="-1" strike="noStrike">
+          <a:lstStyle/>
+          <a:p>
+            <a:endParaRPr lang="en-US" sz="11700" b="0" strike="noStrike" spc="-1">
               <a:solidFill>
                 <a:srgbClr val="070707"/>
               </a:solidFill>
@@ -2659,11 +2886,12 @@
           </a:prstGeom>
         </p:spPr>
         <p:txBody>
-          <a:bodyPr lIns="0" rIns="0" tIns="0" bIns="0">
+          <a:bodyPr lIns="0" tIns="0" rIns="0" bIns="0">
             <a:normAutofit/>
           </a:bodyPr>
-          <a:p>
-            <a:endParaRPr b="0" lang="en-US" sz="11700" spc="-1" strike="noStrike">
+          <a:lstStyle/>
+          <a:p>
+            <a:endParaRPr lang="en-US" sz="11700" b="0" strike="noStrike" spc="-1">
               <a:solidFill>
                 <a:srgbClr val="070707"/>
               </a:solidFill>
@@ -2692,11 +2920,12 @@
           </a:prstGeom>
         </p:spPr>
         <p:txBody>
-          <a:bodyPr lIns="0" rIns="0" tIns="0" bIns="0">
+          <a:bodyPr lIns="0" tIns="0" rIns="0" bIns="0">
             <a:normAutofit/>
           </a:bodyPr>
-          <a:p>
-            <a:endParaRPr b="0" lang="en-US" sz="11700" spc="-1" strike="noStrike">
+          <a:lstStyle/>
+          <a:p>
+            <a:endParaRPr lang="en-US" sz="11700" b="0" strike="noStrike" spc="-1">
               <a:solidFill>
                 <a:srgbClr val="070707"/>
               </a:solidFill>
@@ -2707,11 +2936,14 @@
       </p:sp>
     </p:spTree>
   </p:cSld>
+  <p:clrMapOvr>
+    <a:masterClrMapping/>
+  </p:clrMapOvr>
 </p:sldLayout>
 </file>
 
 <file path=ppt/slideLayouts/slideLayout9.xml><?xml version="1.0" encoding="utf-8"?>
-<p:sldLayout xmlns:a="http://schemas.openxmlformats.org/drawingml/2006/main" xmlns:p="http://schemas.openxmlformats.org/presentationml/2006/main" xmlns:r="http://schemas.openxmlformats.org/officeDocument/2006/relationships" xmlns:p14="http://schemas.microsoft.com/office/powerpoint/2010/main" xmlns:p15="http://schemas.microsoft.com/office/powerpoint/2012/main" xmlns:mc="http://schemas.openxmlformats.org/markup-compatibility/2006" type="twoObjOverTx" preserve="1">
+<p:sldLayout xmlns:a="http://schemas.openxmlformats.org/drawingml/2006/main" xmlns:r="http://schemas.openxmlformats.org/officeDocument/2006/relationships" xmlns:p="http://schemas.openxmlformats.org/presentationml/2006/main" type="twoObjOverTx" preserve="1">
   <p:cSld name="Title, 2 Content over Content">
     <p:spTree>
       <p:nvGrpSpPr>
@@ -2747,9 +2979,10 @@
           </a:prstGeom>
         </p:spPr>
         <p:txBody>
-          <a:bodyPr lIns="0" rIns="0" tIns="0" bIns="0" anchor="ctr"/>
-          <a:p>
-            <a:endParaRPr b="0" lang="en-US" sz="6600" spc="-1" strike="noStrike">
+          <a:bodyPr lIns="0" tIns="0" rIns="0" bIns="0" anchor="ctr"/>
+          <a:lstStyle/>
+          <a:p>
+            <a:endParaRPr lang="en-US" sz="6600" b="0" strike="noStrike" spc="-1">
               <a:solidFill>
                 <a:srgbClr val="070707"/>
               </a:solidFill>
@@ -2778,11 +3011,12 @@
           </a:prstGeom>
         </p:spPr>
         <p:txBody>
-          <a:bodyPr lIns="0" rIns="0" tIns="0" bIns="0">
+          <a:bodyPr lIns="0" tIns="0" rIns="0" bIns="0">
             <a:normAutofit/>
           </a:bodyPr>
-          <a:p>
-            <a:endParaRPr b="0" lang="en-US" sz="11700" spc="-1" strike="noStrike">
+          <a:lstStyle/>
+          <a:p>
+            <a:endParaRPr lang="en-US" sz="11700" b="0" strike="noStrike" spc="-1">
               <a:solidFill>
                 <a:srgbClr val="070707"/>
               </a:solidFill>
@@ -2811,11 +3045,12 @@
           </a:prstGeom>
         </p:spPr>
         <p:txBody>
-          <a:bodyPr lIns="0" rIns="0" tIns="0" bIns="0">
+          <a:bodyPr lIns="0" tIns="0" rIns="0" bIns="0">
             <a:normAutofit/>
           </a:bodyPr>
-          <a:p>
-            <a:endParaRPr b="0" lang="en-US" sz="11700" spc="-1" strike="noStrike">
+          <a:lstStyle/>
+          <a:p>
+            <a:endParaRPr lang="en-US" sz="11700" b="0" strike="noStrike" spc="-1">
               <a:solidFill>
                 <a:srgbClr val="070707"/>
               </a:solidFill>
@@ -2844,11 +3079,12 @@
           </a:prstGeom>
         </p:spPr>
         <p:txBody>
-          <a:bodyPr lIns="0" rIns="0" tIns="0" bIns="0">
+          <a:bodyPr lIns="0" tIns="0" rIns="0" bIns="0">
             <a:normAutofit/>
           </a:bodyPr>
-          <a:p>
-            <a:endParaRPr b="0" lang="en-US" sz="11700" spc="-1" strike="noStrike">
+          <a:lstStyle/>
+          <a:p>
+            <a:endParaRPr lang="en-US" sz="11700" b="0" strike="noStrike" spc="-1">
               <a:solidFill>
                 <a:srgbClr val="070707"/>
               </a:solidFill>
@@ -2859,17 +3095,21 @@
       </p:sp>
     </p:spTree>
   </p:cSld>
+  <p:clrMapOvr>
+    <a:masterClrMapping/>
+  </p:clrMapOvr>
 </p:sldLayout>
 </file>
 
 <file path=ppt/slideMasters/slideMaster1.xml><?xml version="1.0" encoding="utf-8"?>
-<p:sldMaster xmlns:a="http://schemas.openxmlformats.org/drawingml/2006/main" xmlns:p="http://schemas.openxmlformats.org/presentationml/2006/main" xmlns:r="http://schemas.openxmlformats.org/officeDocument/2006/relationships" xmlns:p14="http://schemas.microsoft.com/office/powerpoint/2010/main" xmlns:p15="http://schemas.microsoft.com/office/powerpoint/2012/main" xmlns:mc="http://schemas.openxmlformats.org/markup-compatibility/2006">
+<p:sldMaster xmlns:a="http://schemas.openxmlformats.org/drawingml/2006/main" xmlns:r="http://schemas.openxmlformats.org/officeDocument/2006/relationships" xmlns:p="http://schemas.openxmlformats.org/presentationml/2006/main">
   <p:cSld>
     <p:bg>
       <p:bgPr>
         <a:solidFill>
-          <a:srgbClr val="ffffff"/>
+          <a:srgbClr val="FFFFFF"/>
         </a:solidFill>
+        <a:effectLst/>
       </p:bgPr>
     </p:bg>
     <p:spTree>
@@ -2888,12 +3128,12 @@
       </p:grpSpPr>
       <p:pic>
         <p:nvPicPr>
-          <p:cNvPr id="0" name="Picture 5" descr=""/>
+          <p:cNvPr id="4" name="Picture 5"/>
           <p:cNvPicPr/>
           <p:nvPr/>
         </p:nvPicPr>
         <p:blipFill>
-          <a:blip r:embed="rId2"/>
+          <a:blip r:embed="rId14"/>
           <a:stretch/>
         </p:blipFill>
         <p:spPr>
@@ -2911,7 +3151,7 @@
       </p:pic>
       <p:sp>
         <p:nvSpPr>
-          <p:cNvPr id="1" name="CustomShape 1"/>
+          <p:cNvPr id="5" name="CustomShape 1"/>
           <p:cNvSpPr/>
           <p:nvPr/>
         </p:nvSpPr>
@@ -2931,13 +3171,20 @@
           </a:ln>
         </p:spPr>
         <p:style>
-          <a:lnRef idx="0"/>
-          <a:fillRef idx="0"/>
-          <a:effectRef idx="0"/>
+          <a:lnRef idx="0">
+            <a:scrgbClr r="0" g="0" b="0"/>
+          </a:lnRef>
+          <a:fillRef idx="0">
+            <a:scrgbClr r="0" g="0" b="0"/>
+          </a:fillRef>
+          <a:effectRef idx="0">
+            <a:scrgbClr r="0" g="0" b="0"/>
+          </a:effectRef>
           <a:fontRef idx="minor"/>
         </p:style>
         <p:txBody>
-          <a:bodyPr lIns="347400" rIns="343080" tIns="347400" bIns="343080" anchor="b"/>
+          <a:bodyPr lIns="347400" tIns="347400" rIns="343080" bIns="343080" anchor="b"/>
+          <a:lstStyle/>
           <a:p>
             <a:pPr>
               <a:lnSpc>
@@ -2948,7 +3195,7 @@
               </a:spcAft>
             </a:pPr>
             <a:r>
-              <a:rPr b="0" lang="en-US" sz="2000" spc="-1" strike="noStrike">
+              <a:rPr lang="en-US" sz="2000" b="0" strike="noStrike" spc="-1">
                 <a:solidFill>
                   <a:srgbClr val="000000"/>
                 </a:solidFill>
@@ -2957,7 +3204,7 @@
               </a:rPr>
               <a:t>This is a caption for the example and it may be this long or longer</a:t>
             </a:r>
-            <a:endParaRPr b="0" lang="en-US" sz="2000" spc="-1" strike="noStrike">
+            <a:endParaRPr lang="en-US" sz="2000" b="0" strike="noStrike" spc="-1">
               <a:latin typeface="Arial"/>
             </a:endParaRPr>
           </a:p>
@@ -2983,10 +3230,11 @@
           </a:prstGeom>
         </p:spPr>
         <p:txBody>
-          <a:bodyPr lIns="0" rIns="0" tIns="0" bIns="0" anchor="ctr"/>
+          <a:bodyPr lIns="0" tIns="0" rIns="0" bIns="0" anchor="ctr"/>
+          <a:lstStyle/>
           <a:p>
             <a:r>
-              <a:rPr b="0" lang="en-US" sz="6600" spc="-1" strike="noStrike">
+              <a:rPr lang="en-US" sz="6600" b="0" strike="noStrike" spc="-1">
                 <a:solidFill>
                   <a:srgbClr val="070707"/>
                 </a:solidFill>
@@ -2994,12 +3242,6 @@
               </a:rPr>
               <a:t>Click to edit the title text format</a:t>
             </a:r>
-            <a:endParaRPr b="0" lang="en-US" sz="6600" spc="-1" strike="noStrike">
-              <a:solidFill>
-                <a:srgbClr val="070707"/>
-              </a:solidFill>
-              <a:latin typeface="Arial"/>
-            </a:endParaRPr>
           </a:p>
         </p:txBody>
       </p:sp>
@@ -3023,9 +3265,10 @@
           </a:prstGeom>
         </p:spPr>
         <p:txBody>
-          <a:bodyPr lIns="0" rIns="0" tIns="0" bIns="0">
+          <a:bodyPr lIns="0" tIns="0" rIns="0" bIns="0">
             <a:normAutofit/>
           </a:bodyPr>
+          <a:lstStyle/>
           <a:p>
             <a:pPr marL="432000" indent="-324000">
               <a:spcBef>
@@ -3039,41 +3282,17 @@
               <a:buChar char=""/>
             </a:pPr>
             <a:r>
-              <a:rPr b="0" lang="en-US" sz="11700" spc="-1" strike="noStrike">
+              <a:rPr lang="en-US" sz="11700" b="0" strike="noStrike" spc="-1">
                 <a:solidFill>
                   <a:srgbClr val="070707"/>
                 </a:solidFill>
                 <a:latin typeface="Arial"/>
               </a:rPr>
-              <a:t>Click to edit </a:t>
+              <a:t>Click to edit the outline text format</a:t>
             </a:r>
-            <a:r>
-              <a:rPr b="0" lang="en-US" sz="11700" spc="-1" strike="noStrike">
-                <a:solidFill>
-                  <a:srgbClr val="070707"/>
-                </a:solidFill>
-                <a:latin typeface="Arial"/>
-              </a:rPr>
-              <a:t>the outline </a:t>
-            </a:r>
-            <a:r>
-              <a:rPr b="0" lang="en-US" sz="11700" spc="-1" strike="noStrike">
-                <a:solidFill>
-                  <a:srgbClr val="070707"/>
-                </a:solidFill>
-                <a:latin typeface="Arial"/>
-              </a:rPr>
-              <a:t>text format</a:t>
-            </a:r>
-            <a:endParaRPr b="0" lang="en-US" sz="11700" spc="-1" strike="noStrike">
-              <a:solidFill>
-                <a:srgbClr val="070707"/>
-              </a:solidFill>
-              <a:latin typeface="Arial"/>
-            </a:endParaRPr>
-          </a:p>
-          <a:p>
-            <a:pPr lvl="1" marL="864000" indent="-324000">
+          </a:p>
+          <a:p>
+            <a:pPr marL="864000" lvl="1" indent="-324000">
               <a:spcBef>
                 <a:spcPts val="1134"/>
               </a:spcBef>
@@ -3085,32 +3304,17 @@
               <a:buChar char=""/>
             </a:pPr>
             <a:r>
-              <a:rPr b="0" lang="en-US" sz="8800" spc="-1" strike="noStrike">
+              <a:rPr lang="en-US" sz="8800" b="0" strike="noStrike" spc="-1">
                 <a:solidFill>
                   <a:srgbClr val="070707"/>
                 </a:solidFill>
                 <a:latin typeface="Arial"/>
               </a:rPr>
-              <a:t>Second </a:t>
+              <a:t>Second Outline Level</a:t>
             </a:r>
-            <a:r>
-              <a:rPr b="0" lang="en-US" sz="8800" spc="-1" strike="noStrike">
-                <a:solidFill>
-                  <a:srgbClr val="070707"/>
-                </a:solidFill>
-                <a:latin typeface="Arial"/>
-              </a:rPr>
-              <a:t>Outline Level</a:t>
-            </a:r>
-            <a:endParaRPr b="0" lang="en-US" sz="8800" spc="-1" strike="noStrike">
-              <a:solidFill>
-                <a:srgbClr val="070707"/>
-              </a:solidFill>
-              <a:latin typeface="Arial"/>
-            </a:endParaRPr>
-          </a:p>
-          <a:p>
-            <a:pPr lvl="2" marL="1296000" indent="-288000">
+          </a:p>
+          <a:p>
+            <a:pPr marL="1296000" lvl="2" indent="-288000">
               <a:spcBef>
                 <a:spcPts val="850"/>
               </a:spcBef>
@@ -3122,32 +3326,17 @@
               <a:buChar char=""/>
             </a:pPr>
             <a:r>
-              <a:rPr b="0" lang="en-US" sz="7300" spc="-1" strike="noStrike">
+              <a:rPr lang="en-US" sz="7300" b="0" strike="noStrike" spc="-1">
                 <a:solidFill>
                   <a:srgbClr val="070707"/>
                 </a:solidFill>
                 <a:latin typeface="Arial"/>
               </a:rPr>
-              <a:t>Third Outline </a:t>
+              <a:t>Third Outline Level</a:t>
             </a:r>
-            <a:r>
-              <a:rPr b="0" lang="en-US" sz="7300" spc="-1" strike="noStrike">
-                <a:solidFill>
-                  <a:srgbClr val="070707"/>
-                </a:solidFill>
-                <a:latin typeface="Arial"/>
-              </a:rPr>
-              <a:t>Level</a:t>
-            </a:r>
-            <a:endParaRPr b="0" lang="en-US" sz="7300" spc="-1" strike="noStrike">
-              <a:solidFill>
-                <a:srgbClr val="070707"/>
-              </a:solidFill>
-              <a:latin typeface="Arial"/>
-            </a:endParaRPr>
-          </a:p>
-          <a:p>
-            <a:pPr lvl="3" marL="1728000" indent="-216000">
+          </a:p>
+          <a:p>
+            <a:pPr marL="1728000" lvl="3" indent="-216000">
               <a:spcBef>
                 <a:spcPts val="567"/>
               </a:spcBef>
@@ -3159,32 +3348,17 @@
               <a:buChar char=""/>
             </a:pPr>
             <a:r>
-              <a:rPr b="0" lang="en-US" sz="7300" spc="-1" strike="noStrike">
+              <a:rPr lang="en-US" sz="7300" b="0" strike="noStrike" spc="-1">
                 <a:solidFill>
                   <a:srgbClr val="070707"/>
                 </a:solidFill>
                 <a:latin typeface="Arial"/>
               </a:rPr>
-              <a:t>Fourth Outline </a:t>
+              <a:t>Fourth Outline Level</a:t>
             </a:r>
-            <a:r>
-              <a:rPr b="0" lang="en-US" sz="7300" spc="-1" strike="noStrike">
-                <a:solidFill>
-                  <a:srgbClr val="070707"/>
-                </a:solidFill>
-                <a:latin typeface="Arial"/>
-              </a:rPr>
-              <a:t>Level</a:t>
-            </a:r>
-            <a:endParaRPr b="0" lang="en-US" sz="7300" spc="-1" strike="noStrike">
-              <a:solidFill>
-                <a:srgbClr val="070707"/>
-              </a:solidFill>
-              <a:latin typeface="Arial"/>
-            </a:endParaRPr>
-          </a:p>
-          <a:p>
-            <a:pPr lvl="4" marL="2160000" indent="-216000">
+          </a:p>
+          <a:p>
+            <a:pPr marL="2160000" lvl="4" indent="-216000">
               <a:spcBef>
                 <a:spcPts val="283"/>
               </a:spcBef>
@@ -3196,7 +3370,7 @@
               <a:buChar char=""/>
             </a:pPr>
             <a:r>
-              <a:rPr b="0" lang="en-US" sz="2000" spc="-1" strike="noStrike">
+              <a:rPr lang="en-US" sz="2000" b="0" strike="noStrike" spc="-1">
                 <a:solidFill>
                   <a:srgbClr val="070707"/>
                 </a:solidFill>
@@ -3204,15 +3378,9 @@
               </a:rPr>
               <a:t>Fifth Outline Level</a:t>
             </a:r>
-            <a:endParaRPr b="0" lang="en-US" sz="2000" spc="-1" strike="noStrike">
-              <a:solidFill>
-                <a:srgbClr val="070707"/>
-              </a:solidFill>
-              <a:latin typeface="Arial"/>
-            </a:endParaRPr>
-          </a:p>
-          <a:p>
-            <a:pPr lvl="5" marL="2592000" indent="-216000">
+          </a:p>
+          <a:p>
+            <a:pPr marL="2592000" lvl="5" indent="-216000">
               <a:spcBef>
                 <a:spcPts val="283"/>
               </a:spcBef>
@@ -3224,7 +3392,7 @@
               <a:buChar char=""/>
             </a:pPr>
             <a:r>
-              <a:rPr b="0" lang="en-US" sz="2000" spc="-1" strike="noStrike">
+              <a:rPr lang="en-US" sz="2000" b="0" strike="noStrike" spc="-1">
                 <a:solidFill>
                   <a:srgbClr val="070707"/>
                 </a:solidFill>
@@ -3232,15 +3400,9 @@
               </a:rPr>
               <a:t>Sixth Outline Level</a:t>
             </a:r>
-            <a:endParaRPr b="0" lang="en-US" sz="2000" spc="-1" strike="noStrike">
-              <a:solidFill>
-                <a:srgbClr val="070707"/>
-              </a:solidFill>
-              <a:latin typeface="Arial"/>
-            </a:endParaRPr>
-          </a:p>
-          <a:p>
-            <a:pPr lvl="6" marL="3024000" indent="-216000">
+          </a:p>
+          <a:p>
+            <a:pPr marL="3024000" lvl="6" indent="-216000">
               <a:spcBef>
                 <a:spcPts val="283"/>
               </a:spcBef>
@@ -3252,7 +3414,7 @@
               <a:buChar char=""/>
             </a:pPr>
             <a:r>
-              <a:rPr b="0" lang="en-US" sz="2000" spc="-1" strike="noStrike">
+              <a:rPr lang="en-US" sz="2000" b="0" strike="noStrike" spc="-1">
                 <a:solidFill>
                   <a:srgbClr val="070707"/>
                 </a:solidFill>
@@ -3260,43 +3422,43 @@
               </a:rPr>
               <a:t>Seventh Outline Level</a:t>
             </a:r>
-            <a:endParaRPr b="0" lang="en-US" sz="2000" spc="-1" strike="noStrike">
-              <a:solidFill>
-                <a:srgbClr val="070707"/>
-              </a:solidFill>
-              <a:latin typeface="Arial"/>
-            </a:endParaRPr>
           </a:p>
         </p:txBody>
       </p:sp>
     </p:spTree>
   </p:cSld>
-  <p:clrMap bg1="lt1" bg2="lt2" tx1="dk1" tx2="dk2" accent1="accent1" accent2="accent2" accent3="accent3" accent4="accent4" accent5="accent5" accent6="accent6" hlink="hlink" folHlink="folHlink"/>
+  <p:clrMap bg1="lt1" tx1="dk1" bg2="lt2" tx2="dk2" accent1="accent1" accent2="accent2" accent3="accent3" accent4="accent4" accent5="accent5" accent6="accent6" hlink="hlink" folHlink="folHlink"/>
   <p:sldLayoutIdLst>
-    <p:sldLayoutId id="2147483649" r:id="rId3"/>
-    <p:sldLayoutId id="2147483650" r:id="rId4"/>
-    <p:sldLayoutId id="2147483651" r:id="rId5"/>
-    <p:sldLayoutId id="2147483652" r:id="rId6"/>
-    <p:sldLayoutId id="2147483653" r:id="rId7"/>
-    <p:sldLayoutId id="2147483654" r:id="rId8"/>
-    <p:sldLayoutId id="2147483655" r:id="rId9"/>
-    <p:sldLayoutId id="2147483656" r:id="rId10"/>
-    <p:sldLayoutId id="2147483657" r:id="rId11"/>
-    <p:sldLayoutId id="2147483658" r:id="rId12"/>
-    <p:sldLayoutId id="2147483659" r:id="rId13"/>
-    <p:sldLayoutId id="2147483660" r:id="rId14"/>
+    <p:sldLayoutId id="2147483649" r:id="rId1"/>
+    <p:sldLayoutId id="2147483650" r:id="rId2"/>
+    <p:sldLayoutId id="2147483651" r:id="rId3"/>
+    <p:sldLayoutId id="2147483652" r:id="rId4"/>
+    <p:sldLayoutId id="2147483653" r:id="rId5"/>
+    <p:sldLayoutId id="2147483654" r:id="rId6"/>
+    <p:sldLayoutId id="2147483655" r:id="rId7"/>
+    <p:sldLayoutId id="2147483656" r:id="rId8"/>
+    <p:sldLayoutId id="2147483657" r:id="rId9"/>
+    <p:sldLayoutId id="2147483658" r:id="rId10"/>
+    <p:sldLayoutId id="2147483659" r:id="rId11"/>
+    <p:sldLayoutId id="2147483660" r:id="rId12"/>
   </p:sldLayoutIdLst>
+  <p:txStyles>
+    <p:titleStyle/>
+    <p:bodyStyle/>
+    <p:otherStyle/>
+  </p:txStyles>
 </p:sldMaster>
 </file>
 
 <file path=ppt/slideMasters/slideMaster2.xml><?xml version="1.0" encoding="utf-8"?>
-<p:sldMaster xmlns:a="http://schemas.openxmlformats.org/drawingml/2006/main" xmlns:p="http://schemas.openxmlformats.org/presentationml/2006/main" xmlns:r="http://schemas.openxmlformats.org/officeDocument/2006/relationships" xmlns:p14="http://schemas.microsoft.com/office/powerpoint/2010/main" xmlns:p15="http://schemas.microsoft.com/office/powerpoint/2012/main" xmlns:mc="http://schemas.openxmlformats.org/markup-compatibility/2006">
+<p:sldMaster xmlns:a="http://schemas.openxmlformats.org/drawingml/2006/main" xmlns:r="http://schemas.openxmlformats.org/officeDocument/2006/relationships" xmlns:p="http://schemas.openxmlformats.org/presentationml/2006/main">
   <p:cSld>
     <p:bg>
       <p:bgPr>
         <a:solidFill>
-          <a:srgbClr val="ffffff"/>
+          <a:srgbClr val="FFFFFF"/>
         </a:solidFill>
+        <a:effectLst/>
       </p:bgPr>
     </p:bg>
     <p:spTree>
@@ -3315,12 +3477,12 @@
       </p:grpSpPr>
       <p:pic>
         <p:nvPicPr>
-          <p:cNvPr id="40" name="Picture 5" descr=""/>
+          <p:cNvPr id="40" name="Picture 5"/>
           <p:cNvPicPr/>
           <p:nvPr/>
         </p:nvPicPr>
         <p:blipFill>
-          <a:blip r:embed="rId2"/>
+          <a:blip r:embed="rId14"/>
           <a:stretch/>
         </p:blipFill>
         <p:spPr>
@@ -3358,13 +3520,20 @@
           </a:ln>
         </p:spPr>
         <p:style>
-          <a:lnRef idx="0"/>
-          <a:fillRef idx="0"/>
-          <a:effectRef idx="0"/>
+          <a:lnRef idx="0">
+            <a:scrgbClr r="0" g="0" b="0"/>
+          </a:lnRef>
+          <a:fillRef idx="0">
+            <a:scrgbClr r="0" g="0" b="0"/>
+          </a:fillRef>
+          <a:effectRef idx="0">
+            <a:scrgbClr r="0" g="0" b="0"/>
+          </a:effectRef>
           <a:fontRef idx="minor"/>
         </p:style>
         <p:txBody>
-          <a:bodyPr lIns="347400" rIns="343080" tIns="347400" bIns="343080" anchor="b"/>
+          <a:bodyPr lIns="347400" tIns="347400" rIns="343080" bIns="343080" anchor="b"/>
+          <a:lstStyle/>
           <a:p>
             <a:pPr>
               <a:lnSpc>
@@ -3375,7 +3544,7 @@
               </a:spcAft>
             </a:pPr>
             <a:r>
-              <a:rPr b="0" lang="en-US" sz="2000" spc="-1" strike="noStrike">
+              <a:rPr lang="en-US" sz="2000" b="0" strike="noStrike" spc="-1">
                 <a:solidFill>
                   <a:srgbClr val="000000"/>
                 </a:solidFill>
@@ -3384,7 +3553,7 @@
               </a:rPr>
               <a:t>This is a caption for the example and it may be this long or longer</a:t>
             </a:r>
-            <a:endParaRPr b="0" lang="en-US" sz="2000" spc="-1" strike="noStrike">
+            <a:endParaRPr lang="en-US" sz="2000" b="0" strike="noStrike" spc="-1">
               <a:latin typeface="Arial"/>
             </a:endParaRPr>
           </a:p>
@@ -3409,8 +3578,8 @@
               <a:schemeClr val="bg1"/>
             </a:solidFill>
             <a:round/>
-            <a:headEnd len="med" type="oval" w="med"/>
-            <a:tailEnd len="med" type="oval" w="med"/>
+            <a:headEnd type="oval" w="med" len="med"/>
+            <a:tailEnd type="oval" w="med" len="med"/>
           </a:ln>
         </p:spPr>
         <p:style>
@@ -3445,8 +3614,8 @@
               <a:schemeClr val="bg1"/>
             </a:solidFill>
             <a:round/>
-            <a:headEnd len="med" type="oval" w="med"/>
-            <a:tailEnd len="med" type="oval" w="med"/>
+            <a:headEnd type="oval" w="med" len="med"/>
+            <a:tailEnd type="oval" w="med" len="med"/>
           </a:ln>
         </p:spPr>
         <p:style>
@@ -3481,8 +3650,8 @@
               <a:schemeClr val="bg1"/>
             </a:solidFill>
             <a:round/>
-            <a:headEnd len="med" type="oval" w="med"/>
-            <a:tailEnd len="med" type="oval" w="med"/>
+            <a:headEnd type="oval" w="med" len="med"/>
+            <a:tailEnd type="oval" w="med" len="med"/>
           </a:ln>
         </p:spPr>
         <p:style>
@@ -3517,8 +3686,8 @@
               <a:schemeClr val="bg1"/>
             </a:solidFill>
             <a:round/>
-            <a:headEnd len="med" type="oval" w="med"/>
-            <a:tailEnd len="med" type="oval" w="med"/>
+            <a:headEnd type="oval" w="med" len="med"/>
+            <a:tailEnd type="oval" w="med" len="med"/>
           </a:ln>
         </p:spPr>
         <p:style>
@@ -3554,7 +3723,8 @@
           </a:prstGeom>
         </p:spPr>
         <p:txBody>
-          <a:bodyPr lIns="347400" rIns="343080" tIns="347400" bIns="343080" anchor="b"/>
+          <a:bodyPr lIns="347400" tIns="347400" rIns="343080" bIns="343080" anchor="b"/>
+          <a:lstStyle/>
           <a:p>
             <a:pPr>
               <a:lnSpc>
@@ -3562,7 +3732,7 @@
               </a:lnSpc>
             </a:pPr>
             <a:r>
-              <a:rPr b="1" lang="en-US" sz="4000" spc="-1" strike="noStrike">
+              <a:rPr lang="en-US" sz="4000" b="1" strike="noStrike" spc="-1">
                 <a:solidFill>
                   <a:srgbClr val="000000"/>
                 </a:solidFill>
@@ -3571,7 +3741,7 @@
               </a:rPr>
               <a:t>Next Steps and Future Direction (Click to Edit) </a:t>
             </a:r>
-            <a:endParaRPr b="0" lang="en-US" sz="4000" spc="-1" strike="noStrike">
+            <a:endParaRPr lang="en-US" sz="4000" b="0" strike="noStrike" spc="-1">
               <a:solidFill>
                 <a:srgbClr val="070707"/>
               </a:solidFill>
@@ -3600,7 +3770,8 @@
           </a:prstGeom>
         </p:spPr>
         <p:txBody>
-          <a:bodyPr lIns="90000" rIns="90000" tIns="45000" bIns="45000"/>
+          <a:bodyPr lIns="90000" tIns="45000" rIns="90000" bIns="45000"/>
+          <a:lstStyle/>
           <a:p>
             <a:pPr marL="476280" indent="-475920">
               <a:lnSpc>
@@ -3616,7 +3787,7 @@
               <a:buChar char="•"/>
             </a:pPr>
             <a:r>
-              <a:rPr b="0" lang="en-US" sz="4000" spc="-1" strike="noStrike">
+              <a:rPr lang="en-US" sz="4000" b="0" strike="noStrike" spc="-1">
                 <a:solidFill>
                   <a:srgbClr val="070707"/>
                 </a:solidFill>
@@ -3624,15 +3795,9 @@
               </a:rPr>
               <a:t>Edit Master text styles</a:t>
             </a:r>
-            <a:endParaRPr b="0" lang="en-US" sz="4000" spc="-1" strike="noStrike">
-              <a:solidFill>
-                <a:srgbClr val="070707"/>
-              </a:solidFill>
-              <a:latin typeface="Arial"/>
-            </a:endParaRPr>
-          </a:p>
-          <a:p>
-            <a:pPr lvl="1" marL="1111320" indent="-634680">
+          </a:p>
+          <a:p>
+            <a:pPr marL="1111320" lvl="1" indent="-634680">
               <a:lnSpc>
                 <a:spcPct val="100000"/>
               </a:lnSpc>
@@ -3646,7 +3811,7 @@
               <a:buChar char="–"/>
             </a:pPr>
             <a:r>
-              <a:rPr b="0" lang="en-US" sz="3000" spc="-1" strike="noStrike">
+              <a:rPr lang="en-US" sz="3000" b="0" strike="noStrike" spc="-1">
                 <a:solidFill>
                   <a:srgbClr val="070707"/>
                 </a:solidFill>
@@ -3654,15 +3819,9 @@
               </a:rPr>
               <a:t>Second level</a:t>
             </a:r>
-            <a:endParaRPr b="0" lang="en-US" sz="3000" spc="-1" strike="noStrike">
-              <a:solidFill>
-                <a:srgbClr val="070707"/>
-              </a:solidFill>
-              <a:latin typeface="Arial"/>
-            </a:endParaRPr>
-          </a:p>
-          <a:p>
-            <a:pPr lvl="2" marL="1682640" indent="-539280">
+          </a:p>
+          <a:p>
+            <a:pPr marL="1682640" lvl="2" indent="-539280">
               <a:lnSpc>
                 <a:spcPct val="100000"/>
               </a:lnSpc>
@@ -3676,7 +3835,7 @@
               <a:buChar char="•"/>
             </a:pPr>
             <a:r>
-              <a:rPr b="0" lang="en-US" sz="3000" spc="-1" strike="noStrike">
+              <a:rPr lang="en-US" sz="3000" b="0" strike="noStrike" spc="-1">
                 <a:solidFill>
                   <a:srgbClr val="070707"/>
                 </a:solidFill>
@@ -3684,15 +3843,9 @@
               </a:rPr>
               <a:t>Third level</a:t>
             </a:r>
-            <a:endParaRPr b="0" lang="en-US" sz="3000" spc="-1" strike="noStrike">
-              <a:solidFill>
-                <a:srgbClr val="070707"/>
-              </a:solidFill>
-              <a:latin typeface="Arial"/>
-            </a:endParaRPr>
-          </a:p>
-          <a:p>
-            <a:pPr lvl="3" marL="2476440" indent="-666360">
+          </a:p>
+          <a:p>
+            <a:pPr marL="2476440" lvl="3" indent="-666360">
               <a:lnSpc>
                 <a:spcPct val="100000"/>
               </a:lnSpc>
@@ -3706,7 +3859,7 @@
               <a:buChar char="–"/>
             </a:pPr>
             <a:r>
-              <a:rPr b="0" lang="en-US" sz="3000" spc="-1" strike="noStrike">
+              <a:rPr lang="en-US" sz="3000" b="0" strike="noStrike" spc="-1">
                 <a:solidFill>
                   <a:srgbClr val="070707"/>
                 </a:solidFill>
@@ -3714,12 +3867,6 @@
               </a:rPr>
               <a:t>Fourth level</a:t>
             </a:r>
-            <a:endParaRPr b="0" lang="en-US" sz="3000" spc="-1" strike="noStrike">
-              <a:solidFill>
-                <a:srgbClr val="070707"/>
-              </a:solidFill>
-              <a:latin typeface="Arial"/>
-            </a:endParaRPr>
           </a:p>
         </p:txBody>
       </p:sp>
@@ -3743,7 +3890,8 @@
           </a:prstGeom>
         </p:spPr>
         <p:txBody>
-          <a:bodyPr lIns="90000" rIns="90000" tIns="45000" bIns="45000"/>
+          <a:bodyPr lIns="90000" tIns="45000" rIns="90000" bIns="45000"/>
+          <a:lstStyle/>
           <a:p>
             <a:pPr marL="476280" indent="-475920">
               <a:lnSpc>
@@ -3759,7 +3907,7 @@
               <a:buChar char="•"/>
             </a:pPr>
             <a:r>
-              <a:rPr b="0" lang="en-US" sz="4000" spc="-1" strike="noStrike">
+              <a:rPr lang="en-US" sz="4000" b="0" strike="noStrike" spc="-1">
                 <a:solidFill>
                   <a:srgbClr val="070707"/>
                 </a:solidFill>
@@ -3767,15 +3915,9 @@
               </a:rPr>
               <a:t>Edit Master text styles</a:t>
             </a:r>
-            <a:endParaRPr b="0" lang="en-US" sz="4000" spc="-1" strike="noStrike">
-              <a:solidFill>
-                <a:srgbClr val="070707"/>
-              </a:solidFill>
-              <a:latin typeface="Arial"/>
-            </a:endParaRPr>
-          </a:p>
-          <a:p>
-            <a:pPr lvl="1" marL="1111320" indent="-634680">
+          </a:p>
+          <a:p>
+            <a:pPr marL="1111320" lvl="1" indent="-634680">
               <a:lnSpc>
                 <a:spcPct val="100000"/>
               </a:lnSpc>
@@ -3789,7 +3931,7 @@
               <a:buChar char="–"/>
             </a:pPr>
             <a:r>
-              <a:rPr b="0" lang="en-US" sz="3000" spc="-1" strike="noStrike">
+              <a:rPr lang="en-US" sz="3000" b="0" strike="noStrike" spc="-1">
                 <a:solidFill>
                   <a:srgbClr val="070707"/>
                 </a:solidFill>
@@ -3797,15 +3939,9 @@
               </a:rPr>
               <a:t>Second level</a:t>
             </a:r>
-            <a:endParaRPr b="0" lang="en-US" sz="3000" spc="-1" strike="noStrike">
-              <a:solidFill>
-                <a:srgbClr val="070707"/>
-              </a:solidFill>
-              <a:latin typeface="Arial"/>
-            </a:endParaRPr>
-          </a:p>
-          <a:p>
-            <a:pPr lvl="2" marL="1682640" indent="-539280">
+          </a:p>
+          <a:p>
+            <a:pPr marL="1682640" lvl="2" indent="-539280">
               <a:lnSpc>
                 <a:spcPct val="100000"/>
               </a:lnSpc>
@@ -3819,7 +3955,7 @@
               <a:buChar char="•"/>
             </a:pPr>
             <a:r>
-              <a:rPr b="0" lang="en-US" sz="3000" spc="-1" strike="noStrike">
+              <a:rPr lang="en-US" sz="3000" b="0" strike="noStrike" spc="-1">
                 <a:solidFill>
                   <a:srgbClr val="070707"/>
                 </a:solidFill>
@@ -3827,15 +3963,9 @@
               </a:rPr>
               <a:t>Third level</a:t>
             </a:r>
-            <a:endParaRPr b="0" lang="en-US" sz="3000" spc="-1" strike="noStrike">
-              <a:solidFill>
-                <a:srgbClr val="070707"/>
-              </a:solidFill>
-              <a:latin typeface="Arial"/>
-            </a:endParaRPr>
-          </a:p>
-          <a:p>
-            <a:pPr lvl="3" marL="2476440" indent="-666360">
+          </a:p>
+          <a:p>
+            <a:pPr marL="2476440" lvl="3" indent="-666360">
               <a:lnSpc>
                 <a:spcPct val="100000"/>
               </a:lnSpc>
@@ -3849,7 +3979,7 @@
               <a:buChar char="–"/>
             </a:pPr>
             <a:r>
-              <a:rPr b="0" lang="en-US" sz="3000" spc="-1" strike="noStrike">
+              <a:rPr lang="en-US" sz="3000" b="0" strike="noStrike" spc="-1">
                 <a:solidFill>
                   <a:srgbClr val="070707"/>
                 </a:solidFill>
@@ -3857,12 +3987,6 @@
               </a:rPr>
               <a:t>Fourth level</a:t>
             </a:r>
-            <a:endParaRPr b="0" lang="en-US" sz="3000" spc="-1" strike="noStrike">
-              <a:solidFill>
-                <a:srgbClr val="070707"/>
-              </a:solidFill>
-              <a:latin typeface="Arial"/>
-            </a:endParaRPr>
           </a:p>
         </p:txBody>
       </p:sp>
@@ -3886,7 +4010,8 @@
           </a:prstGeom>
         </p:spPr>
         <p:txBody>
-          <a:bodyPr lIns="90000" rIns="90000" tIns="45000" bIns="45000"/>
+          <a:bodyPr lIns="90000" tIns="45000" rIns="90000" bIns="45000"/>
+          <a:lstStyle/>
           <a:p>
             <a:pPr marL="476280" indent="-475920">
               <a:lnSpc>
@@ -3902,7 +4027,7 @@
               <a:buChar char="•"/>
             </a:pPr>
             <a:r>
-              <a:rPr b="0" lang="en-US" sz="4000" spc="-1" strike="noStrike">
+              <a:rPr lang="en-US" sz="4000" b="0" strike="noStrike" spc="-1">
                 <a:solidFill>
                   <a:srgbClr val="070707"/>
                 </a:solidFill>
@@ -3910,15 +4035,9 @@
               </a:rPr>
               <a:t>Edit Master text styles</a:t>
             </a:r>
-            <a:endParaRPr b="0" lang="en-US" sz="4000" spc="-1" strike="noStrike">
-              <a:solidFill>
-                <a:srgbClr val="070707"/>
-              </a:solidFill>
-              <a:latin typeface="Arial"/>
-            </a:endParaRPr>
-          </a:p>
-          <a:p>
-            <a:pPr lvl="1" marL="1111320" indent="-634680">
+          </a:p>
+          <a:p>
+            <a:pPr marL="1111320" lvl="1" indent="-634680">
               <a:lnSpc>
                 <a:spcPct val="100000"/>
               </a:lnSpc>
@@ -3932,7 +4051,7 @@
               <a:buChar char="–"/>
             </a:pPr>
             <a:r>
-              <a:rPr b="0" lang="en-US" sz="3000" spc="-1" strike="noStrike">
+              <a:rPr lang="en-US" sz="3000" b="0" strike="noStrike" spc="-1">
                 <a:solidFill>
                   <a:srgbClr val="070707"/>
                 </a:solidFill>
@@ -3940,15 +4059,9 @@
               </a:rPr>
               <a:t>Second level</a:t>
             </a:r>
-            <a:endParaRPr b="0" lang="en-US" sz="3000" spc="-1" strike="noStrike">
-              <a:solidFill>
-                <a:srgbClr val="070707"/>
-              </a:solidFill>
-              <a:latin typeface="Arial"/>
-            </a:endParaRPr>
-          </a:p>
-          <a:p>
-            <a:pPr lvl="2" marL="1682640" indent="-539280">
+          </a:p>
+          <a:p>
+            <a:pPr marL="1682640" lvl="2" indent="-539280">
               <a:lnSpc>
                 <a:spcPct val="100000"/>
               </a:lnSpc>
@@ -3962,7 +4075,7 @@
               <a:buChar char="•"/>
             </a:pPr>
             <a:r>
-              <a:rPr b="0" lang="en-US" sz="3000" spc="-1" strike="noStrike">
+              <a:rPr lang="en-US" sz="3000" b="0" strike="noStrike" spc="-1">
                 <a:solidFill>
                   <a:srgbClr val="070707"/>
                 </a:solidFill>
@@ -3970,15 +4083,9 @@
               </a:rPr>
               <a:t>Third level</a:t>
             </a:r>
-            <a:endParaRPr b="0" lang="en-US" sz="3000" spc="-1" strike="noStrike">
-              <a:solidFill>
-                <a:srgbClr val="070707"/>
-              </a:solidFill>
-              <a:latin typeface="Arial"/>
-            </a:endParaRPr>
-          </a:p>
-          <a:p>
-            <a:pPr lvl="3" marL="2476440" indent="-666360">
+          </a:p>
+          <a:p>
+            <a:pPr marL="2476440" lvl="3" indent="-666360">
               <a:lnSpc>
                 <a:spcPct val="100000"/>
               </a:lnSpc>
@@ -3992,7 +4099,7 @@
               <a:buChar char="–"/>
             </a:pPr>
             <a:r>
-              <a:rPr b="0" lang="en-US" sz="3000" spc="-1" strike="noStrike">
+              <a:rPr lang="en-US" sz="3000" b="0" strike="noStrike" spc="-1">
                 <a:solidFill>
                   <a:srgbClr val="070707"/>
                 </a:solidFill>
@@ -4000,12 +4107,6 @@
               </a:rPr>
               <a:t>Fourth level</a:t>
             </a:r>
-            <a:endParaRPr b="0" lang="en-US" sz="3000" spc="-1" strike="noStrike">
-              <a:solidFill>
-                <a:srgbClr val="070707"/>
-              </a:solidFill>
-              <a:latin typeface="Arial"/>
-            </a:endParaRPr>
           </a:p>
         </p:txBody>
       </p:sp>
@@ -4029,7 +4130,8 @@
           </a:prstGeom>
         </p:spPr>
         <p:txBody>
-          <a:bodyPr lIns="90000" rIns="90000" tIns="45000" bIns="45000"/>
+          <a:bodyPr lIns="90000" tIns="45000" rIns="90000" bIns="45000"/>
+          <a:lstStyle/>
           <a:p>
             <a:pPr marL="476280" indent="-475920">
               <a:lnSpc>
@@ -4045,7 +4147,7 @@
               <a:buChar char="•"/>
             </a:pPr>
             <a:r>
-              <a:rPr b="0" lang="en-US" sz="4000" spc="-1" strike="noStrike">
+              <a:rPr lang="en-US" sz="4000" b="0" strike="noStrike" spc="-1">
                 <a:solidFill>
                   <a:srgbClr val="070707"/>
                 </a:solidFill>
@@ -4053,15 +4155,9 @@
               </a:rPr>
               <a:t>Edit Master text styles</a:t>
             </a:r>
-            <a:endParaRPr b="0" lang="en-US" sz="4000" spc="-1" strike="noStrike">
-              <a:solidFill>
-                <a:srgbClr val="070707"/>
-              </a:solidFill>
-              <a:latin typeface="Arial"/>
-            </a:endParaRPr>
-          </a:p>
-          <a:p>
-            <a:pPr lvl="1" marL="1111320" indent="-634680">
+          </a:p>
+          <a:p>
+            <a:pPr marL="1111320" lvl="1" indent="-634680">
               <a:lnSpc>
                 <a:spcPct val="100000"/>
               </a:lnSpc>
@@ -4075,7 +4171,7 @@
               <a:buChar char="–"/>
             </a:pPr>
             <a:r>
-              <a:rPr b="0" lang="en-US" sz="3000" spc="-1" strike="noStrike">
+              <a:rPr lang="en-US" sz="3000" b="0" strike="noStrike" spc="-1">
                 <a:solidFill>
                   <a:srgbClr val="070707"/>
                 </a:solidFill>
@@ -4083,15 +4179,9 @@
               </a:rPr>
               <a:t>Second level</a:t>
             </a:r>
-            <a:endParaRPr b="0" lang="en-US" sz="3000" spc="-1" strike="noStrike">
-              <a:solidFill>
-                <a:srgbClr val="070707"/>
-              </a:solidFill>
-              <a:latin typeface="Arial"/>
-            </a:endParaRPr>
-          </a:p>
-          <a:p>
-            <a:pPr lvl="2" marL="1682640" indent="-539280">
+          </a:p>
+          <a:p>
+            <a:pPr marL="1682640" lvl="2" indent="-539280">
               <a:lnSpc>
                 <a:spcPct val="100000"/>
               </a:lnSpc>
@@ -4105,7 +4195,7 @@
               <a:buChar char="•"/>
             </a:pPr>
             <a:r>
-              <a:rPr b="0" lang="en-US" sz="3000" spc="-1" strike="noStrike">
+              <a:rPr lang="en-US" sz="3000" b="0" strike="noStrike" spc="-1">
                 <a:solidFill>
                   <a:srgbClr val="070707"/>
                 </a:solidFill>
@@ -4113,15 +4203,9 @@
               </a:rPr>
               <a:t>Third level</a:t>
             </a:r>
-            <a:endParaRPr b="0" lang="en-US" sz="3000" spc="-1" strike="noStrike">
-              <a:solidFill>
-                <a:srgbClr val="070707"/>
-              </a:solidFill>
-              <a:latin typeface="Arial"/>
-            </a:endParaRPr>
-          </a:p>
-          <a:p>
-            <a:pPr lvl="3" marL="2476440" indent="-666360">
+          </a:p>
+          <a:p>
+            <a:pPr marL="2476440" lvl="3" indent="-666360">
               <a:lnSpc>
                 <a:spcPct val="100000"/>
               </a:lnSpc>
@@ -4135,7 +4219,7 @@
               <a:buChar char="–"/>
             </a:pPr>
             <a:r>
-              <a:rPr b="0" lang="en-US" sz="3000" spc="-1" strike="noStrike">
+              <a:rPr lang="en-US" sz="3000" b="0" strike="noStrike" spc="-1">
                 <a:solidFill>
                   <a:srgbClr val="070707"/>
                 </a:solidFill>
@@ -4143,12 +4227,6 @@
               </a:rPr>
               <a:t>Fourth level</a:t>
             </a:r>
-            <a:endParaRPr b="0" lang="en-US" sz="3000" spc="-1" strike="noStrike">
-              <a:solidFill>
-                <a:srgbClr val="070707"/>
-              </a:solidFill>
-              <a:latin typeface="Arial"/>
-            </a:endParaRPr>
           </a:p>
         </p:txBody>
       </p:sp>
@@ -4172,7 +4250,8 @@
           </a:prstGeom>
         </p:spPr>
         <p:txBody>
-          <a:bodyPr lIns="347400" rIns="343080" tIns="347400" bIns="343080" anchor="ctr"/>
+          <a:bodyPr lIns="347400" tIns="347400" rIns="343080" bIns="343080" anchor="ctr"/>
+          <a:lstStyle/>
           <a:p>
             <a:pPr>
               <a:lnSpc>
@@ -4180,16 +4259,16 @@
               </a:lnSpc>
             </a:pPr>
             <a:r>
-              <a:rPr b="1" lang="en-US" sz="6400" spc="-1" strike="noStrike">
+              <a:rPr lang="en-US" sz="6400" b="1" strike="noStrike" spc="-1">
                 <a:solidFill>
-                  <a:srgbClr val="ffffff"/>
+                  <a:srgbClr val="FFFFFF"/>
                 </a:solidFill>
                 <a:latin typeface="Arial"/>
                 <a:ea typeface="FreightText Book"/>
               </a:rPr>
               <a:t>Click to edit Poster Title</a:t>
             </a:r>
-            <a:endParaRPr b="0" lang="en-US" sz="6400" spc="-1" strike="noStrike">
+            <a:endParaRPr lang="en-US" sz="6400" b="0" strike="noStrike" spc="-1">
               <a:solidFill>
                 <a:srgbClr val="070707"/>
               </a:solidFill>
@@ -4218,7 +4297,8 @@
           </a:prstGeom>
         </p:spPr>
         <p:txBody>
-          <a:bodyPr lIns="347400" rIns="343080" tIns="347400" bIns="343080" anchor="b"/>
+          <a:bodyPr lIns="347400" tIns="347400" rIns="343080" bIns="343080" anchor="b"/>
+          <a:lstStyle/>
           <a:p>
             <a:pPr>
               <a:lnSpc>
@@ -4226,7 +4306,7 @@
               </a:lnSpc>
             </a:pPr>
             <a:r>
-              <a:rPr b="1" lang="en-US" sz="4000" spc="-1" strike="noStrike">
+              <a:rPr lang="en-US" sz="4000" b="1" strike="noStrike" spc="-1">
                 <a:solidFill>
                   <a:srgbClr val="000000"/>
                 </a:solidFill>
@@ -4235,7 +4315,7 @@
               </a:rPr>
               <a:t>Research Problem Definition (Click to Edit) </a:t>
             </a:r>
-            <a:endParaRPr b="0" lang="en-US" sz="4000" spc="-1" strike="noStrike">
+            <a:endParaRPr lang="en-US" sz="4000" b="0" strike="noStrike" spc="-1">
               <a:solidFill>
                 <a:srgbClr val="070707"/>
               </a:solidFill>
@@ -4264,7 +4344,8 @@
           </a:prstGeom>
         </p:spPr>
         <p:txBody>
-          <a:bodyPr lIns="90000" rIns="90000" tIns="45000" bIns="45000"/>
+          <a:bodyPr lIns="90000" tIns="45000" rIns="90000" bIns="45000"/>
+          <a:lstStyle/>
           <a:p>
             <a:pPr>
               <a:lnSpc>
@@ -4275,7 +4356,7 @@
               </a:spcBef>
             </a:pPr>
             <a:r>
-              <a:rPr b="1" lang="en-US" sz="4000" spc="-1" strike="noStrike">
+              <a:rPr lang="en-US" sz="4000" b="1" strike="noStrike" spc="-1">
                 <a:solidFill>
                   <a:srgbClr val="070707"/>
                 </a:solidFill>
@@ -4283,7 +4364,7 @@
               </a:rPr>
               <a:t>Results (Click to Edit)</a:t>
             </a:r>
-            <a:endParaRPr b="0" lang="en-US" sz="4000" spc="-1" strike="noStrike">
+            <a:endParaRPr lang="en-US" sz="4000" b="0" strike="noStrike" spc="-1">
               <a:solidFill>
                 <a:srgbClr val="070707"/>
               </a:solidFill>
@@ -4312,7 +4393,8 @@
           </a:prstGeom>
         </p:spPr>
         <p:txBody>
-          <a:bodyPr lIns="347400" rIns="343080" tIns="347400" bIns="343080" anchor="b"/>
+          <a:bodyPr lIns="347400" tIns="347400" rIns="343080" bIns="343080" anchor="b"/>
+          <a:lstStyle/>
           <a:p>
             <a:pPr>
               <a:lnSpc>
@@ -4320,7 +4402,7 @@
               </a:lnSpc>
             </a:pPr>
             <a:r>
-              <a:rPr b="1" lang="en-US" sz="4000" spc="-1" strike="noStrike">
+              <a:rPr lang="en-US" sz="4000" b="1" strike="noStrike" spc="-1">
                 <a:solidFill>
                   <a:srgbClr val="000000"/>
                 </a:solidFill>
@@ -4329,7 +4411,7 @@
               </a:rPr>
               <a:t>Methods and Approach (Click to Edit) </a:t>
             </a:r>
-            <a:endParaRPr b="0" lang="en-US" sz="4000" spc="-1" strike="noStrike">
+            <a:endParaRPr lang="en-US" sz="4000" b="0" strike="noStrike" spc="-1">
               <a:solidFill>
                 <a:srgbClr val="070707"/>
               </a:solidFill>
@@ -4358,7 +4440,8 @@
           </a:prstGeom>
         </p:spPr>
         <p:txBody>
-          <a:bodyPr lIns="347400" rIns="343080" tIns="347400" bIns="343080" anchor="ctr"/>
+          <a:bodyPr lIns="347400" tIns="347400" rIns="343080" bIns="343080" anchor="ctr"/>
+          <a:lstStyle/>
           <a:p>
             <a:pPr>
               <a:lnSpc>
@@ -4366,16 +4449,16 @@
               </a:lnSpc>
             </a:pPr>
             <a:r>
-              <a:rPr b="1" lang="en-US" sz="3200" spc="-1" strike="noStrike">
+              <a:rPr lang="en-US" sz="3200" b="1" strike="noStrike" spc="-1">
                 <a:solidFill>
-                  <a:srgbClr val="ffffff"/>
+                  <a:srgbClr val="FFFFFF"/>
                 </a:solidFill>
                 <a:latin typeface="Arial"/>
                 <a:ea typeface="FreightText Book"/>
               </a:rPr>
               <a:t>Department Name</a:t>
             </a:r>
-            <a:endParaRPr b="0" lang="en-US" sz="3200" spc="-1" strike="noStrike">
+            <a:endParaRPr lang="en-US" sz="3200" b="0" strike="noStrike" spc="-1">
               <a:solidFill>
                 <a:srgbClr val="070707"/>
               </a:solidFill>
@@ -4404,7 +4487,8 @@
           </a:prstGeom>
         </p:spPr>
         <p:txBody>
-          <a:bodyPr lIns="347400" rIns="343080" tIns="347400" bIns="343080" anchor="ctr"/>
+          <a:bodyPr lIns="347400" tIns="347400" rIns="343080" bIns="343080" anchor="ctr"/>
+          <a:lstStyle/>
           <a:p>
             <a:pPr algn="r">
               <a:lnSpc>
@@ -4412,16 +4496,16 @@
               </a:lnSpc>
             </a:pPr>
             <a:r>
-              <a:rPr b="1" lang="en-US" sz="3200" spc="-1" strike="noStrike">
+              <a:rPr lang="en-US" sz="3200" b="1" strike="noStrike" spc="-1">
                 <a:solidFill>
-                  <a:srgbClr val="ffffff"/>
+                  <a:srgbClr val="FFFFFF"/>
                 </a:solidFill>
                 <a:latin typeface="Arial"/>
                 <a:ea typeface="FreightText Book"/>
               </a:rPr>
               <a:t>Student’s Name, PI Name,</a:t>
             </a:r>
-            <a:endParaRPr b="0" lang="en-US" sz="3200" spc="-1" strike="noStrike">
+            <a:endParaRPr lang="en-US" sz="3200" b="0" strike="noStrike" spc="-1">
               <a:solidFill>
                 <a:srgbClr val="070707"/>
               </a:solidFill>
@@ -4432,32 +4516,38 @@
       </p:sp>
     </p:spTree>
   </p:cSld>
-  <p:clrMap bg1="lt1" bg2="lt2" tx1="dk1" tx2="dk2" accent1="accent1" accent2="accent2" accent3="accent3" accent4="accent4" accent5="accent5" accent6="accent6" hlink="hlink" folHlink="folHlink"/>
+  <p:clrMap bg1="lt1" tx1="dk1" bg2="lt2" tx2="dk2" accent1="accent1" accent2="accent2" accent3="accent3" accent4="accent4" accent5="accent5" accent6="accent6" hlink="hlink" folHlink="folHlink"/>
   <p:sldLayoutIdLst>
-    <p:sldLayoutId id="2147483662" r:id="rId3"/>
-    <p:sldLayoutId id="2147483663" r:id="rId4"/>
-    <p:sldLayoutId id="2147483664" r:id="rId5"/>
-    <p:sldLayoutId id="2147483665" r:id="rId6"/>
-    <p:sldLayoutId id="2147483666" r:id="rId7"/>
-    <p:sldLayoutId id="2147483667" r:id="rId8"/>
-    <p:sldLayoutId id="2147483668" r:id="rId9"/>
-    <p:sldLayoutId id="2147483669" r:id="rId10"/>
-    <p:sldLayoutId id="2147483670" r:id="rId11"/>
-    <p:sldLayoutId id="2147483671" r:id="rId12"/>
-    <p:sldLayoutId id="2147483672" r:id="rId13"/>
-    <p:sldLayoutId id="2147483673" r:id="rId14"/>
+    <p:sldLayoutId id="2147483662" r:id="rId1"/>
+    <p:sldLayoutId id="2147483663" r:id="rId2"/>
+    <p:sldLayoutId id="2147483664" r:id="rId3"/>
+    <p:sldLayoutId id="2147483665" r:id="rId4"/>
+    <p:sldLayoutId id="2147483666" r:id="rId5"/>
+    <p:sldLayoutId id="2147483667" r:id="rId6"/>
+    <p:sldLayoutId id="2147483668" r:id="rId7"/>
+    <p:sldLayoutId id="2147483669" r:id="rId8"/>
+    <p:sldLayoutId id="2147483670" r:id="rId9"/>
+    <p:sldLayoutId id="2147483671" r:id="rId10"/>
+    <p:sldLayoutId id="2147483672" r:id="rId11"/>
+    <p:sldLayoutId id="2147483673" r:id="rId12"/>
   </p:sldLayoutIdLst>
+  <p:txStyles>
+    <p:titleStyle/>
+    <p:bodyStyle/>
+    <p:otherStyle/>
+  </p:txStyles>
 </p:sldMaster>
 </file>
 
 <file path=ppt/slides/slide1.xml><?xml version="1.0" encoding="utf-8"?>
-<p:sld xmlns:a="http://schemas.openxmlformats.org/drawingml/2006/main" xmlns:p="http://schemas.openxmlformats.org/presentationml/2006/main" xmlns:r="http://schemas.openxmlformats.org/officeDocument/2006/relationships" xmlns:p14="http://schemas.microsoft.com/office/powerpoint/2010/main" xmlns:p15="http://schemas.microsoft.com/office/powerpoint/2012/main" xmlns:mc="http://schemas.openxmlformats.org/markup-compatibility/2006">
+<p:sld xmlns:a="http://schemas.openxmlformats.org/drawingml/2006/main" xmlns:r="http://schemas.openxmlformats.org/officeDocument/2006/relationships" xmlns:p="http://schemas.openxmlformats.org/presentationml/2006/main">
   <p:cSld>
     <p:bg>
       <p:bgPr>
         <a:solidFill>
-          <a:srgbClr val="ffffff"/>
+          <a:srgbClr val="FFFFFF"/>
         </a:solidFill>
+        <a:effectLst/>
       </p:bgPr>
     </p:bg>
     <p:spTree>
@@ -4494,7 +4584,8 @@
           </a:ln>
         </p:spPr>
         <p:txBody>
-          <a:bodyPr lIns="90000" rIns="90000" tIns="45000" bIns="45000"/>
+          <a:bodyPr lIns="90000" tIns="45000" rIns="90000" bIns="45000"/>
+          <a:lstStyle/>
           <a:p>
             <a:pPr>
               <a:lnSpc>
@@ -4505,7 +4596,7 @@
               </a:spcBef>
             </a:pPr>
             <a:r>
-              <a:rPr b="0" lang="en-US" sz="6000" spc="-1" strike="noStrike">
+              <a:rPr lang="en-US" sz="6000" b="0" strike="noStrike" spc="-1">
                 <a:solidFill>
                   <a:srgbClr val="000000"/>
                 </a:solidFill>
@@ -4514,7 +4605,7 @@
               </a:rPr>
               <a:t>This slide/poster size is 40.97” x 23.04” (16:9 aspect ratio)</a:t>
             </a:r>
-            <a:endParaRPr b="0" lang="en-US" sz="6000" spc="-1" strike="noStrike">
+            <a:endParaRPr lang="en-US" sz="6000" b="0" strike="noStrike" spc="-1">
               <a:solidFill>
                 <a:srgbClr val="070707"/>
               </a:solidFill>
@@ -4531,7 +4622,7 @@
               </a:spcBef>
             </a:pPr>
             <a:r>
-              <a:rPr b="0" lang="en-US" sz="6000" spc="-1" strike="noStrike">
+              <a:rPr lang="en-US" sz="6000" b="0" strike="noStrike" spc="-1">
                 <a:solidFill>
                   <a:srgbClr val="000000"/>
                 </a:solidFill>
@@ -4540,7 +4631,7 @@
               </a:rPr>
               <a:t>Minimum font: 28pt (this may seem large, but at this poster size it’s not)</a:t>
             </a:r>
-            <a:endParaRPr b="0" lang="en-US" sz="6000" spc="-1" strike="noStrike">
+            <a:endParaRPr lang="en-US" sz="6000" b="0" strike="noStrike" spc="-1">
               <a:solidFill>
                 <a:srgbClr val="070707"/>
               </a:solidFill>
@@ -4557,7 +4648,7 @@
               </a:spcBef>
             </a:pPr>
             <a:r>
-              <a:rPr b="0" lang="en-US" sz="6000" spc="-1" strike="noStrike">
+              <a:rPr lang="en-US" sz="6000" b="0" strike="noStrike" spc="-1">
                 <a:solidFill>
                   <a:srgbClr val="000000"/>
                 </a:solidFill>
@@ -4566,7 +4657,7 @@
               </a:rPr>
               <a:t>Recommended font types: Calibri, Arial, Times New Roman</a:t>
             </a:r>
-            <a:endParaRPr b="0" lang="en-US" sz="6000" spc="-1" strike="noStrike">
+            <a:endParaRPr lang="en-US" sz="6000" b="0" strike="noStrike" spc="-1">
               <a:solidFill>
                 <a:srgbClr val="070707"/>
               </a:solidFill>
@@ -4583,7 +4674,7 @@
               </a:spcBef>
             </a:pPr>
             <a:r>
-              <a:rPr b="1" lang="en-US" sz="6000" spc="-1" strike="noStrike">
+              <a:rPr lang="en-US" sz="6000" b="1" strike="noStrike" spc="-1">
                 <a:solidFill>
                   <a:srgbClr val="000000"/>
                 </a:solidFill>
@@ -4592,7 +4683,7 @@
               </a:rPr>
               <a:t>When you are creating your e-poster, please make sure to save your formulas as an image and embed it into your presentation or they will change on our Surface Tablets.</a:t>
             </a:r>
-            <a:endParaRPr b="0" lang="en-US" sz="6000" spc="-1" strike="noStrike">
+            <a:endParaRPr lang="en-US" sz="6000" b="0" strike="noStrike" spc="-1">
               <a:solidFill>
                 <a:srgbClr val="070707"/>
               </a:solidFill>
@@ -4609,7 +4700,7 @@
               </a:spcBef>
             </a:pPr>
             <a:r>
-              <a:rPr b="1" lang="en-US" sz="6000" spc="-1" strike="noStrike">
+              <a:rPr lang="en-US" sz="6000" b="1" strike="noStrike" spc="-1">
                 <a:solidFill>
                   <a:srgbClr val="000000"/>
                 </a:solidFill>
@@ -4618,7 +4709,7 @@
               </a:rPr>
               <a:t>Any video files need to be in .mov, .mpeg, .m4v or .mpg format</a:t>
             </a:r>
-            <a:endParaRPr b="0" lang="en-US" sz="6000" spc="-1" strike="noStrike">
+            <a:endParaRPr lang="en-US" sz="6000" b="0" strike="noStrike" spc="-1">
               <a:solidFill>
                 <a:srgbClr val="070707"/>
               </a:solidFill>
@@ -4635,7 +4726,7 @@
               </a:spcBef>
             </a:pPr>
             <a:r>
-              <a:rPr b="1" lang="en-US" sz="6000" spc="-1" strike="noStrike">
+              <a:rPr lang="en-US" sz="6000" b="1" strike="noStrike" spc="-1">
                 <a:solidFill>
                   <a:srgbClr val="000000"/>
                 </a:solidFill>
@@ -4644,7 +4735,7 @@
               </a:rPr>
               <a:t>All files need to be saved in PPTX format</a:t>
             </a:r>
-            <a:endParaRPr b="0" lang="en-US" sz="6000" spc="-1" strike="noStrike">
+            <a:endParaRPr lang="en-US" sz="6000" b="0" strike="noStrike" spc="-1">
               <a:solidFill>
                 <a:srgbClr val="070707"/>
               </a:solidFill>
@@ -4661,7 +4752,7 @@
               </a:spcBef>
             </a:pPr>
             <a:r>
-              <a:rPr b="1" lang="en-US" sz="6000" spc="-1" strike="noStrike">
+              <a:rPr lang="en-US" sz="6000" b="1" strike="noStrike" spc="-1">
                 <a:solidFill>
                   <a:srgbClr val="000000"/>
                 </a:solidFill>
@@ -4670,7 +4761,7 @@
               </a:rPr>
               <a:t>Bring the final version of your eposter and any video files to the event on a flash drive as a backup.</a:t>
             </a:r>
-            <a:endParaRPr b="0" lang="en-US" sz="6000" spc="-1" strike="noStrike">
+            <a:endParaRPr lang="en-US" sz="6000" b="0" strike="noStrike" spc="-1">
               <a:solidFill>
                 <a:srgbClr val="070707"/>
               </a:solidFill>
@@ -4701,7 +4792,8 @@
           </a:ln>
         </p:spPr>
         <p:txBody>
-          <a:bodyPr lIns="347400" rIns="343080" tIns="347400" bIns="343080" anchor="ctr"/>
+          <a:bodyPr lIns="347400" tIns="347400" rIns="343080" bIns="343080" anchor="ctr"/>
+          <a:lstStyle/>
           <a:p>
             <a:pPr algn="ctr">
               <a:lnSpc>
@@ -4709,16 +4801,16 @@
               </a:lnSpc>
             </a:pPr>
             <a:r>
-              <a:rPr b="1" lang="en-US" sz="6400" spc="-1" strike="noStrike">
+              <a:rPr lang="en-US" sz="6400" b="1" strike="noStrike" spc="-1">
                 <a:solidFill>
-                  <a:srgbClr val="ffffff"/>
+                  <a:srgbClr val="FFFFFF"/>
                 </a:solidFill>
                 <a:latin typeface="Arial"/>
                 <a:ea typeface="FreightText Book"/>
               </a:rPr>
               <a:t>Instructions</a:t>
             </a:r>
-            <a:endParaRPr b="0" lang="en-US" sz="6400" spc="-1" strike="noStrike">
+            <a:endParaRPr lang="en-US" sz="6400" b="0" strike="noStrike" spc="-1">
               <a:solidFill>
                 <a:srgbClr val="070707"/>
               </a:solidFill>
@@ -4729,22 +4821,25 @@
       </p:sp>
     </p:spTree>
   </p:cSld>
+  <p:clrMapOvr>
+    <a:masterClrMapping/>
+  </p:clrMapOvr>
   <p:timing>
     <p:tnLst>
       <p:par>
-        <p:cTn id="1" dur="indefinite" restart="never" nodeType="tmRoot">
+        <p:cTn xmlns:p14="http://schemas.microsoft.com/office/powerpoint/2010/main" id="1" dur="indefinite" restart="never" nodeType="tmRoot">
           <p:childTnLst>
             <p:seq>
               <p:cTn id="2" dur="indefinite" nodeType="mainSeq"/>
               <p:prevCondLst>
-                <p:cond delay="0" evt="onPrev">
+                <p:cond evt="onPrev" delay="0">
                   <p:tgtEl>
                     <p:sldTgt/>
                   </p:tgtEl>
                 </p:cond>
               </p:prevCondLst>
               <p:nextCondLst>
-                <p:cond delay="0" evt="onNext">
+                <p:cond evt="onNext" delay="0">
                   <p:tgtEl>
                     <p:sldTgt/>
                   </p:tgtEl>
@@ -4760,7 +4855,7 @@
 </file>
 
 <file path=ppt/slides/slide2.xml><?xml version="1.0" encoding="utf-8"?>
-<p:sld xmlns:a="http://schemas.openxmlformats.org/drawingml/2006/main" xmlns:p="http://schemas.openxmlformats.org/presentationml/2006/main" xmlns:r="http://schemas.openxmlformats.org/officeDocument/2006/relationships" xmlns:p14="http://schemas.microsoft.com/office/powerpoint/2010/main" xmlns:p15="http://schemas.microsoft.com/office/powerpoint/2012/main" xmlns:mc="http://schemas.openxmlformats.org/markup-compatibility/2006">
+<p:sld xmlns:a="http://schemas.openxmlformats.org/drawingml/2006/main" xmlns:r="http://schemas.openxmlformats.org/officeDocument/2006/relationships" xmlns:p="http://schemas.openxmlformats.org/presentationml/2006/main">
   <p:cSld>
     <p:spTree>
       <p:nvGrpSpPr>
@@ -4778,31 +4873,10 @@
       </p:grpSpPr>
       <p:pic>
         <p:nvPicPr>
-          <p:cNvPr id="95" name="" descr=""/>
-          <p:cNvPicPr/>
-          <p:nvPr/>
-        </p:nvPicPr>
-        <p:blipFill>
-          <a:blip r:embed="rId1"/>
-          <a:stretch/>
-        </p:blipFill>
-        <p:spPr>
-          <a:xfrm>
-            <a:off x="18792000" y="10092600"/>
-            <a:ext cx="8949240" cy="419400"/>
-          </a:xfrm>
-          <a:prstGeom prst="rect">
-            <a:avLst/>
-          </a:prstGeom>
-          <a:ln>
-            <a:noFill/>
-          </a:ln>
-        </p:spPr>
-      </p:pic>
-      <p:pic>
-        <p:nvPicPr>
-          <p:cNvPr id="96" name="" descr=""/>
-          <p:cNvPicPr/>
+          <p:cNvPr id="101" name="Picture 100"/>
+          <p:cNvPicPr>
+            <a:picLocks noChangeAspect="1"/>
+          </p:cNvPicPr>
           <p:nvPr/>
         </p:nvPicPr>
         <p:blipFill>
@@ -4811,8 +4885,8 @@
         </p:blipFill>
         <p:spPr>
           <a:xfrm>
-            <a:off x="19872000" y="14976000"/>
-            <a:ext cx="7416000" cy="3735720"/>
+            <a:off x="28467635" y="4956288"/>
+            <a:ext cx="7851648" cy="2891790"/>
           </a:xfrm>
           <a:prstGeom prst="rect">
             <a:avLst/>
@@ -4822,9 +4896,61 @@
           </a:ln>
         </p:spPr>
       </p:pic>
+      <p:sp>
+        <p:nvSpPr>
+          <p:cNvPr id="20" name="TextShape 2"/>
+          <p:cNvSpPr txBox="1"/>
+          <p:nvPr/>
+        </p:nvSpPr>
+        <p:spPr>
+          <a:xfrm>
+            <a:off x="28137600" y="5095080"/>
+            <a:ext cx="8316000" cy="5943240"/>
+          </a:xfrm>
+          <a:prstGeom prst="rect">
+            <a:avLst/>
+          </a:prstGeom>
+          <a:noFill/>
+          <a:ln>
+            <a:noFill/>
+          </a:ln>
+        </p:spPr>
+        <p:txBody>
+          <a:bodyPr lIns="90000" tIns="45000" rIns="90000" bIns="45000"/>
+          <a:lstStyle/>
+          <a:p>
+            <a:pPr marL="360" algn="just">
+              <a:lnSpc>
+                <a:spcPct val="100000"/>
+              </a:lnSpc>
+              <a:spcBef>
+                <a:spcPts val="799"/>
+              </a:spcBef>
+              <a:buClr>
+                <a:srgbClr val="070707"/>
+              </a:buClr>
+            </a:pPr>
+            <a:r>
+              <a:rPr lang="en-US" sz="2800" b="1" strike="noStrike" spc="-1" dirty="0" smtClean="0">
+                <a:solidFill>
+                  <a:srgbClr val="070707"/>
+                </a:solidFill>
+                <a:latin typeface="Arial"/>
+              </a:rPr>
+              <a:t>Results:</a:t>
+            </a:r>
+            <a:endParaRPr lang="en-US" sz="2800" strike="noStrike" spc="-1" dirty="0">
+              <a:solidFill>
+                <a:srgbClr val="070707"/>
+              </a:solidFill>
+              <a:latin typeface="Arial"/>
+            </a:endParaRPr>
+          </a:p>
+        </p:txBody>
+      </p:sp>
       <p:pic>
         <p:nvPicPr>
-          <p:cNvPr id="97" name="" descr=""/>
+          <p:cNvPr id="95" name="Picture 94"/>
           <p:cNvPicPr/>
           <p:nvPr/>
         </p:nvPicPr>
@@ -4834,8 +4960,56 @@
         </p:blipFill>
         <p:spPr>
           <a:xfrm>
-            <a:off x="27645480" y="5072760"/>
-            <a:ext cx="8570520" cy="5943240"/>
+            <a:off x="19872000" y="5689801"/>
+            <a:ext cx="8949240" cy="419400"/>
+          </a:xfrm>
+          <a:prstGeom prst="rect">
+            <a:avLst/>
+          </a:prstGeom>
+          <a:ln>
+            <a:noFill/>
+          </a:ln>
+        </p:spPr>
+      </p:pic>
+      <p:pic>
+        <p:nvPicPr>
+          <p:cNvPr id="96" name="Picture 95"/>
+          <p:cNvPicPr/>
+          <p:nvPr/>
+        </p:nvPicPr>
+        <p:blipFill>
+          <a:blip r:embed="rId4"/>
+          <a:stretch/>
+        </p:blipFill>
+        <p:spPr>
+          <a:xfrm>
+            <a:off x="28592830" y="8181473"/>
+            <a:ext cx="7416000" cy="3735720"/>
+          </a:xfrm>
+          <a:prstGeom prst="rect">
+            <a:avLst/>
+          </a:prstGeom>
+          <a:ln>
+            <a:noFill/>
+          </a:ln>
+        </p:spPr>
+      </p:pic>
+      <p:pic>
+        <p:nvPicPr>
+          <p:cNvPr id="97" name="Picture 96"/>
+          <p:cNvPicPr>
+            <a:picLocks noChangeAspect="1"/>
+          </p:cNvPicPr>
+          <p:nvPr/>
+        </p:nvPicPr>
+        <p:blipFill>
+          <a:blip r:embed="rId5"/>
+          <a:stretch/>
+        </p:blipFill>
+        <p:spPr>
+          <a:xfrm>
+            <a:off x="19978523" y="7249911"/>
+            <a:ext cx="6858000" cy="4755799"/>
           </a:xfrm>
           <a:prstGeom prst="rect">
             <a:avLst/>
@@ -4865,9 +5039,10 @@
           </a:ln>
         </p:spPr>
         <p:txBody>
-          <a:bodyPr lIns="90000" rIns="90000" tIns="45000" bIns="45000"/>
-          <a:p>
-            <a:endParaRPr b="0" lang="en-US" sz="11700" spc="-1" strike="noStrike">
+          <a:bodyPr lIns="90000" tIns="45000" rIns="90000" bIns="45000"/>
+          <a:lstStyle/>
+          <a:p>
+            <a:endParaRPr lang="en-US" sz="11700" b="0" strike="noStrike" spc="-1">
               <a:solidFill>
                 <a:srgbClr val="070707"/>
               </a:solidFill>
@@ -4884,8 +5059,8 @@
         </p:nvSpPr>
         <p:spPr>
           <a:xfrm>
-            <a:off x="19440000" y="5112000"/>
-            <a:ext cx="7560000" cy="5943240"/>
+            <a:off x="19062000" y="5112000"/>
+            <a:ext cx="8316000" cy="5943240"/>
           </a:xfrm>
           <a:prstGeom prst="rect">
             <a:avLst/>
@@ -4896,9 +5071,10 @@
           </a:ln>
         </p:spPr>
         <p:txBody>
-          <a:bodyPr lIns="90000" rIns="90000" tIns="45000" bIns="45000"/>
-          <a:p>
-            <a:pPr marL="476280" indent="-475920" algn="just">
+          <a:bodyPr lIns="90000" tIns="45000" rIns="90000" bIns="45000"/>
+          <a:lstStyle/>
+          <a:p>
+            <a:pPr marL="360" algn="just">
               <a:lnSpc>
                 <a:spcPct val="100000"/>
               </a:lnSpc>
@@ -4908,45 +5084,28 @@
               <a:buClr>
                 <a:srgbClr val="070707"/>
               </a:buClr>
-              <a:buFont typeface="Arial"/>
-              <a:buChar char="•"/>
             </a:pPr>
             <a:r>
-              <a:rPr b="0" lang="en-US" sz="3200" spc="-1" strike="noStrike">
+              <a:rPr lang="en-US" sz="2800" b="1" strike="noStrike" spc="-1" dirty="0" smtClean="0">
                 <a:solidFill>
                   <a:srgbClr val="070707"/>
                 </a:solidFill>
                 <a:latin typeface="Arial"/>
               </a:rPr>
-              <a:t>We present a mechanism for </a:t>
+              <a:t>Problem:</a:t>
             </a:r>
             <a:r>
-              <a:rPr b="1" lang="en-US" sz="3200" spc="-1" strike="noStrike">
+              <a:rPr lang="en-US" sz="2800" b="0" strike="noStrike" spc="-1" dirty="0" smtClean="0">
                 <a:solidFill>
                   <a:srgbClr val="070707"/>
                 </a:solidFill>
                 <a:latin typeface="Arial"/>
               </a:rPr>
-              <a:t>logical theory acquisition</a:t>
+              <a:t> logical theory acquisition</a:t>
             </a:r>
-            <a:r>
-              <a:rPr b="0" lang="en-US" sz="3200" spc="-1" strike="noStrike">
-                <a:solidFill>
-                  <a:srgbClr val="070707"/>
-                </a:solidFill>
-                <a:latin typeface="Arial"/>
-              </a:rPr>
-              <a:t>. It takes a set of observed facts and compresses them into a theory composed of logical rules and a small set of core facts. </a:t>
-            </a:r>
-            <a:endParaRPr b="0" lang="en-US" sz="3200" spc="-1" strike="noStrike">
-              <a:solidFill>
-                <a:srgbClr val="070707"/>
-              </a:solidFill>
-              <a:latin typeface="Arial"/>
-            </a:endParaRPr>
-          </a:p>
-          <a:p>
-            <a:pPr marL="476280" indent="-475920" algn="just">
+          </a:p>
+          <a:p>
+            <a:pPr marL="360" algn="just">
               <a:lnSpc>
                 <a:spcPct val="100000"/>
               </a:lnSpc>
@@ -4956,37 +5115,91 @@
               <a:buClr>
                 <a:srgbClr val="070707"/>
               </a:buClr>
-              <a:buFont typeface="Arial"/>
-              <a:buChar char="•"/>
+            </a:pPr>
+            <a:endParaRPr lang="en-US" sz="2800" spc="-1" dirty="0">
+              <a:solidFill>
+                <a:srgbClr val="070707"/>
+              </a:solidFill>
+              <a:latin typeface="Arial"/>
+            </a:endParaRPr>
+          </a:p>
+          <a:p>
+            <a:pPr marL="360" algn="just">
+              <a:lnSpc>
+                <a:spcPct val="100000"/>
+              </a:lnSpc>
+              <a:spcBef>
+                <a:spcPts val="799"/>
+              </a:spcBef>
+              <a:buClr>
+                <a:srgbClr val="070707"/>
+              </a:buClr>
+            </a:pPr>
+            <a:endParaRPr lang="en-US" sz="2800" b="1" strike="noStrike" spc="-1" dirty="0" smtClean="0">
+              <a:solidFill>
+                <a:srgbClr val="070707"/>
+              </a:solidFill>
+              <a:latin typeface="Arial"/>
+            </a:endParaRPr>
+          </a:p>
+          <a:p>
+            <a:pPr marL="360" algn="just">
+              <a:lnSpc>
+                <a:spcPct val="100000"/>
+              </a:lnSpc>
+              <a:spcBef>
+                <a:spcPts val="799"/>
+              </a:spcBef>
+              <a:buClr>
+                <a:srgbClr val="070707"/>
+              </a:buClr>
             </a:pPr>
             <a:r>
-              <a:rPr b="0" lang="en-US" sz="3200" spc="-1" strike="noStrike">
+              <a:rPr lang="en-US" sz="2800" b="1" strike="noStrike" spc="-1" dirty="0" smtClean="0">
                 <a:solidFill>
                   <a:srgbClr val="070707"/>
                 </a:solidFill>
                 <a:latin typeface="Arial"/>
               </a:rPr>
-              <a:t>Our approach is </a:t>
+              <a:t>Approach:</a:t>
             </a:r>
             <a:r>
-              <a:rPr b="1" lang="en-US" sz="3200" spc="-1" strike="noStrike">
+              <a:rPr lang="en-US" sz="2800" b="0" strike="noStrike" spc="-1" dirty="0" smtClean="0">
                 <a:solidFill>
                   <a:srgbClr val="070707"/>
                 </a:solidFill>
                 <a:latin typeface="Arial"/>
               </a:rPr>
-              <a:t>neuro-symbolic</a:t>
+              <a:t> </a:t>
             </a:r>
             <a:r>
-              <a:rPr b="0" lang="en-US" sz="3200" spc="-1" strike="noStrike">
+              <a:rPr lang="en-US" sz="2800" strike="noStrike" spc="-1" dirty="0" err="1" smtClean="0">
                 <a:solidFill>
                   <a:srgbClr val="070707"/>
                 </a:solidFill>
                 <a:latin typeface="Arial"/>
               </a:rPr>
-              <a:t> and the learned rules and core facts representations are interpretable and can involve predicate invention.</a:t>
+              <a:t>neuro</a:t>
             </a:r>
-            <a:endParaRPr b="0" lang="en-US" sz="3200" spc="-1" strike="noStrike">
+            <a:r>
+              <a:rPr lang="en-US" sz="2800" strike="noStrike" spc="-1" dirty="0">
+                <a:solidFill>
+                  <a:srgbClr val="070707"/>
+                </a:solidFill>
+                <a:latin typeface="Arial"/>
+              </a:rPr>
+              <a:t>-symbolic </a:t>
+            </a:r>
+            <a:r>
+              <a:rPr lang="en-US" sz="2800" strike="noStrike" spc="-1" dirty="0" smtClean="0">
+                <a:solidFill>
+                  <a:srgbClr val="070707"/>
+                </a:solidFill>
+                <a:latin typeface="Arial"/>
+              </a:rPr>
+              <a:t>program induction</a:t>
+            </a:r>
+            <a:endParaRPr lang="en-US" sz="2800" strike="noStrike" spc="-1" dirty="0">
               <a:solidFill>
                 <a:srgbClr val="070707"/>
               </a:solidFill>
@@ -5017,7 +5230,8 @@
           </a:ln>
         </p:spPr>
         <p:txBody>
-          <a:bodyPr lIns="347400" rIns="343080" tIns="347400" bIns="343080" anchor="ctr"/>
+          <a:bodyPr lIns="347400" tIns="347400" rIns="343080" bIns="343080" anchor="ctr"/>
+          <a:lstStyle/>
           <a:p>
             <a:pPr>
               <a:lnSpc>
@@ -5025,47 +5239,24 @@
               </a:lnSpc>
             </a:pPr>
             <a:r>
-              <a:rPr b="1" lang="en-US" sz="6400" spc="-1" strike="noStrike">
+              <a:rPr lang="en-US" sz="6400" b="1" spc="-1" dirty="0" smtClean="0">
                 <a:solidFill>
-                  <a:srgbClr val="ffffff"/>
+                  <a:srgbClr val="FFFFFF"/>
                 </a:solidFill>
                 <a:latin typeface="Arial"/>
                 <a:ea typeface="FreightText Book"/>
               </a:rPr>
-              <a:t>Poster Title</a:t>
+              <a:t>Concept Learning as Program Learning</a:t>
             </a:r>
-            <a:endParaRPr b="0" lang="en-US" sz="6400" spc="-1" strike="noStrike">
-              <a:solidFill>
-                <a:srgbClr val="070707"/>
-              </a:solidFill>
-              <a:latin typeface="Arial"/>
-            </a:endParaRPr>
-          </a:p>
-        </p:txBody>
-      </p:sp>
-      <p:pic>
-        <p:nvPicPr>
-          <p:cNvPr id="101" name="" descr=""/>
-          <p:cNvPicPr/>
-          <p:nvPr/>
-        </p:nvPicPr>
-        <p:blipFill>
-          <a:blip r:embed="rId4"/>
-          <a:stretch/>
-        </p:blipFill>
-        <p:spPr>
-          <a:xfrm>
-            <a:off x="27972000" y="13176000"/>
-            <a:ext cx="9386280" cy="3456000"/>
-          </a:xfrm>
-          <a:prstGeom prst="rect">
-            <a:avLst/>
-          </a:prstGeom>
-          <a:ln>
-            <a:noFill/>
-          </a:ln>
-        </p:spPr>
-      </p:pic>
+            <a:endParaRPr lang="en-US" sz="6400" b="0" strike="noStrike" spc="-1" dirty="0">
+              <a:solidFill>
+                <a:srgbClr val="070707"/>
+              </a:solidFill>
+              <a:latin typeface="Arial"/>
+            </a:endParaRPr>
+          </a:p>
+        </p:txBody>
+      </p:sp>
       <p:sp>
         <p:nvSpPr>
           <p:cNvPr id="102" name="TextShape 4"/>
@@ -5086,7 +5277,8 @@
           </a:ln>
         </p:spPr>
         <p:txBody>
-          <a:bodyPr lIns="90000" rIns="90000" tIns="45000" bIns="45000"/>
+          <a:bodyPr lIns="90000" tIns="45000" rIns="90000" bIns="45000"/>
+          <a:lstStyle/>
           <a:p>
             <a:pPr indent="-324000">
               <a:lnSpc>
@@ -5097,7 +5289,7 @@
               </a:spcBef>
             </a:pPr>
             <a:r>
-              <a:rPr b="1" lang="en-US" sz="4000" spc="-1" strike="noStrike">
+              <a:rPr lang="en-US" sz="4000" b="1" strike="noStrike" spc="-1">
                 <a:solidFill>
                   <a:srgbClr val="070707"/>
                 </a:solidFill>
@@ -5105,12 +5297,6 @@
               </a:rPr>
               <a:t>Logical Rule Induction and Theory Learning</a:t>
             </a:r>
-            <a:endParaRPr b="1" lang="en-US" sz="4000" spc="-1" strike="noStrike">
-              <a:solidFill>
-                <a:srgbClr val="070707"/>
-              </a:solidFill>
-              <a:latin typeface="Arial"/>
-            </a:endParaRPr>
           </a:p>
         </p:txBody>
       </p:sp>
@@ -5136,7 +5322,8 @@
           </a:ln>
         </p:spPr>
         <p:txBody>
-          <a:bodyPr lIns="347400" rIns="343080" tIns="347400" bIns="343080" anchor="ctr"/>
+          <a:bodyPr lIns="347400" tIns="347400" rIns="343080" bIns="343080" anchor="ctr"/>
+          <a:lstStyle/>
           <a:p>
             <a:pPr>
               <a:lnSpc>
@@ -5144,21 +5331,15 @@
               </a:lnSpc>
             </a:pPr>
             <a:r>
-              <a:rPr b="1" lang="en-US" sz="3200" spc="-1" strike="noStrike">
+              <a:rPr lang="en-US" sz="3200" b="1" strike="noStrike" spc="-1" dirty="0" smtClean="0">
                 <a:solidFill>
-                  <a:srgbClr val="ffffff"/>
+                  <a:srgbClr val="FFFFFF"/>
                 </a:solidFill>
                 <a:latin typeface="Arial"/>
                 <a:ea typeface="FreightText Book"/>
               </a:rPr>
-              <a:t>Department Name</a:t>
+              <a:t>Computational Cognitive Science Group,</a:t>
             </a:r>
-            <a:endParaRPr b="0" lang="en-US" sz="3200" spc="-1" strike="noStrike">
-              <a:solidFill>
-                <a:srgbClr val="070707"/>
-              </a:solidFill>
-              <a:latin typeface="Arial"/>
-            </a:endParaRPr>
           </a:p>
           <a:p>
             <a:pPr>
@@ -5167,16 +5348,26 @@
               </a:lnSpc>
             </a:pPr>
             <a:r>
-              <a:rPr b="1" lang="en-US" sz="3200" spc="-1" strike="noStrike">
+              <a:rPr lang="en-US" sz="3200" b="1" strike="noStrike" spc="-1" dirty="0" smtClean="0">
                 <a:solidFill>
-                  <a:srgbClr val="ffffff"/>
+                  <a:srgbClr val="FFFFFF"/>
                 </a:solidFill>
                 <a:latin typeface="Arial"/>
                 <a:ea typeface="FreightText Book"/>
               </a:rPr>
-              <a:t>Scholar Name</a:t>
+              <a:t>Dept. </a:t>
             </a:r>
-            <a:endParaRPr b="0" lang="en-US" sz="3200" spc="-1" strike="noStrike">
+            <a:r>
+              <a:rPr lang="en-US" sz="3200" b="1" spc="-1" dirty="0" smtClean="0">
+                <a:solidFill>
+                  <a:srgbClr val="FFFFFF"/>
+                </a:solidFill>
+                <a:latin typeface="Arial"/>
+                <a:ea typeface="FreightText Book"/>
+              </a:rPr>
+              <a:t>of Brain and Cognitive Sciences</a:t>
+            </a:r>
+            <a:endParaRPr lang="en-US" sz="3200" spc="-1" dirty="0">
               <a:solidFill>
                 <a:srgbClr val="070707"/>
               </a:solidFill>
@@ -5207,7 +5398,8 @@
           </a:ln>
         </p:spPr>
         <p:txBody>
-          <a:bodyPr lIns="347400" rIns="343080" tIns="347400" bIns="343080" anchor="ctr"/>
+          <a:bodyPr lIns="347400" tIns="347400" rIns="343080" bIns="343080" anchor="ctr"/>
+          <a:lstStyle/>
           <a:p>
             <a:pPr algn="r">
               <a:lnSpc>
@@ -5215,21 +5407,35 @@
               </a:lnSpc>
             </a:pPr>
             <a:r>
-              <a:rPr b="1" lang="en-US" sz="3200" spc="-1" strike="noStrike">
+              <a:rPr lang="en-US" sz="3200" b="1" strike="noStrike" spc="-1" dirty="0" smtClean="0">
                 <a:solidFill>
-                  <a:srgbClr val="ffffff"/>
+                  <a:srgbClr val="FFFFFF"/>
                 </a:solidFill>
                 <a:latin typeface="Arial"/>
                 <a:ea typeface="FreightText Book"/>
               </a:rPr>
-              <a:t>Student’s Name, PI Name,</a:t>
+              <a:t>Joshua S. Rule, Andrés </a:t>
             </a:r>
-            <a:endParaRPr b="0" lang="en-US" sz="3200" spc="-1" strike="noStrike">
-              <a:solidFill>
-                <a:srgbClr val="070707"/>
-              </a:solidFill>
-              <a:latin typeface="Arial"/>
-            </a:endParaRPr>
+            <a:r>
+              <a:rPr lang="en-US" sz="3200" b="1" strike="noStrike" spc="-1" dirty="0" err="1" smtClean="0">
+                <a:solidFill>
+                  <a:srgbClr val="FFFFFF"/>
+                </a:solidFill>
+                <a:latin typeface="Arial"/>
+                <a:ea typeface="FreightText Book"/>
+              </a:rPr>
+              <a:t>Campero</a:t>
+            </a:r>
+            <a:r>
+              <a:rPr lang="en-US" sz="3200" b="1" strike="noStrike" spc="-1" dirty="0" smtClean="0">
+                <a:solidFill>
+                  <a:srgbClr val="FFFFFF"/>
+                </a:solidFill>
+                <a:latin typeface="Arial"/>
+                <a:ea typeface="FreightText Book"/>
+              </a:rPr>
+              <a:t>,</a:t>
+            </a:r>
           </a:p>
           <a:p>
             <a:pPr algn="r">
@@ -5238,264 +5444,36 @@
               </a:lnSpc>
             </a:pPr>
             <a:r>
-              <a:rPr b="1" lang="en-US" sz="3200" spc="-1" strike="noStrike">
+              <a:rPr lang="en-US" sz="3200" b="1" spc="-1" dirty="0" smtClean="0">
                 <a:solidFill>
-                  <a:srgbClr val="ffffff"/>
+                  <a:srgbClr val="FFFFFF"/>
                 </a:solidFill>
                 <a:latin typeface="Arial"/>
                 <a:ea typeface="FreightText Book"/>
               </a:rPr>
-              <a:t>Graduate Student Name if applicable</a:t>
+              <a:t>Maxwell Nye, Joshua B. </a:t>
             </a:r>
-            <a:endParaRPr b="0" lang="en-US" sz="3200" spc="-1" strike="noStrike">
-              <a:solidFill>
-                <a:srgbClr val="070707"/>
-              </a:solidFill>
-              <a:latin typeface="Arial"/>
-            </a:endParaRPr>
-          </a:p>
-        </p:txBody>
-      </p:sp>
-      <p:sp>
-        <p:nvSpPr>
-          <p:cNvPr id="105" name="TextShape 7"/>
-          <p:cNvSpPr txBox="1"/>
-          <p:nvPr/>
-        </p:nvSpPr>
-        <p:spPr>
-          <a:xfrm>
-            <a:off x="16496280" y="3562200"/>
-            <a:ext cx="180720" cy="232560"/>
-          </a:xfrm>
-          <a:prstGeom prst="rect">
-            <a:avLst/>
-          </a:prstGeom>
-          <a:noFill/>
-          <a:ln>
-            <a:noFill/>
-          </a:ln>
-        </p:spPr>
-      </p:sp>
-      <p:sp>
-        <p:nvSpPr>
-          <p:cNvPr id="106" name="TextShape 8"/>
-          <p:cNvSpPr txBox="1"/>
-          <p:nvPr/>
-        </p:nvSpPr>
-        <p:spPr>
-          <a:xfrm>
-            <a:off x="19224000" y="12511440"/>
-            <a:ext cx="8568000" cy="880560"/>
-          </a:xfrm>
-          <a:prstGeom prst="rect">
-            <a:avLst/>
-          </a:prstGeom>
-          <a:noFill/>
-          <a:ln>
-            <a:noFill/>
-          </a:ln>
-        </p:spPr>
-        <p:txBody>
-          <a:bodyPr lIns="347400" rIns="343080" tIns="347400" bIns="343080" anchor="b"/>
-          <a:p>
-            <a:pPr indent="-324000">
-              <a:lnSpc>
-                <a:spcPct val="100000"/>
-              </a:lnSpc>
-            </a:pPr>
             <a:r>
-              <a:rPr b="1" lang="en-US" sz="4000" spc="-1" strike="noStrike">
+              <a:rPr lang="en-US" sz="3200" b="1" spc="-1" dirty="0" err="1" smtClean="0">
                 <a:solidFill>
-                  <a:srgbClr val="000000"/>
+                  <a:srgbClr val="FFFFFF"/>
                 </a:solidFill>
                 <a:latin typeface="Arial"/>
+                <a:ea typeface="FreightText Book"/>
               </a:rPr>
-              <a:t>Inductive Logic Programming</a:t>
+              <a:t>Tenenbau</a:t>
             </a:r>
-            <a:endParaRPr b="1" lang="en-US" sz="4000" spc="-1" strike="noStrike">
-              <a:solidFill>
-                <a:srgbClr val="000000"/>
-              </a:solidFill>
-              <a:latin typeface="Arial"/>
-              <a:ea typeface="FreightText Book"/>
-            </a:endParaRPr>
-          </a:p>
-        </p:txBody>
-      </p:sp>
-      <p:sp>
-        <p:nvSpPr>
-          <p:cNvPr id="107" name="TextShape 9"/>
-          <p:cNvSpPr txBox="1"/>
-          <p:nvPr/>
-        </p:nvSpPr>
-        <p:spPr>
-          <a:xfrm>
-            <a:off x="30456000" y="12583440"/>
-            <a:ext cx="5040000" cy="880560"/>
-          </a:xfrm>
-          <a:prstGeom prst="rect">
-            <a:avLst/>
-          </a:prstGeom>
-          <a:noFill/>
-          <a:ln>
-            <a:noFill/>
-          </a:ln>
-        </p:spPr>
-        <p:txBody>
-          <a:bodyPr lIns="347400" rIns="343080" tIns="347400" bIns="343080" anchor="b"/>
-          <a:p>
-            <a:pPr indent="-324000">
-              <a:lnSpc>
-                <a:spcPct val="100000"/>
-              </a:lnSpc>
-            </a:pPr>
             <a:r>
-              <a:rPr b="1" lang="en-US" sz="4000" spc="-1" strike="noStrike">
+              <a:rPr lang="en-US" sz="3200" b="1" strike="noStrike" spc="-1" dirty="0" err="1" smtClean="0">
                 <a:solidFill>
-                  <a:srgbClr val="000000"/>
+                  <a:srgbClr val="FFFFFF"/>
                 </a:solidFill>
                 <a:latin typeface="Arial"/>
+                <a:ea typeface="FreightText Book"/>
               </a:rPr>
-              <a:t>Theory Learning</a:t>
+              <a:t>m</a:t>
             </a:r>
-            <a:endParaRPr b="1" lang="en-US" sz="4000" spc="-1" strike="noStrike">
-              <a:solidFill>
-                <a:srgbClr val="000000"/>
-              </a:solidFill>
-              <a:latin typeface="Arial"/>
-              <a:ea typeface="FreightText Book"/>
-            </a:endParaRPr>
-          </a:p>
-        </p:txBody>
-      </p:sp>
-      <p:sp>
-        <p:nvSpPr>
-          <p:cNvPr id="108" name="TextShape 10"/>
-          <p:cNvSpPr txBox="1"/>
-          <p:nvPr/>
-        </p:nvSpPr>
-        <p:spPr>
-          <a:xfrm>
-            <a:off x="18188280" y="13065120"/>
-            <a:ext cx="9387720" cy="5943240"/>
-          </a:xfrm>
-          <a:prstGeom prst="rect">
-            <a:avLst/>
-          </a:prstGeom>
-          <a:noFill/>
-          <a:ln>
-            <a:noFill/>
-          </a:ln>
-        </p:spPr>
-        <p:txBody>
-          <a:bodyPr lIns="90000" rIns="90000" tIns="45000" bIns="45000"/>
-          <a:p>
-            <a:pPr marL="476280" indent="-475920" algn="just">
-              <a:lnSpc>
-                <a:spcPct val="100000"/>
-              </a:lnSpc>
-              <a:spcBef>
-                <a:spcPts val="799"/>
-              </a:spcBef>
-              <a:buClr>
-                <a:srgbClr val="070707"/>
-              </a:buClr>
-              <a:buFont typeface="Arial"/>
-              <a:buChar char="•"/>
-            </a:pPr>
-            <a:r>
-              <a:rPr b="0" lang="en-US" sz="3200" spc="-1" strike="noStrike">
-                <a:solidFill>
-                  <a:srgbClr val="070707"/>
-                </a:solidFill>
-                <a:latin typeface="Arial"/>
-              </a:rPr>
-              <a:t>We test the problems from (Evans and Grefenstette 2018), the task is to learn a target </a:t>
-            </a:r>
-            <a:r>
-              <a:rPr b="0" lang="en-US" sz="3200" spc="-1" strike="noStrike">
-                <a:solidFill>
-                  <a:srgbClr val="070707"/>
-                </a:solidFill>
-                <a:latin typeface="Arial"/>
-              </a:rPr>
-              <a:t>relation from a set of background knowledge facts.</a:t>
-            </a:r>
-            <a:endParaRPr b="0" lang="en-US" sz="3200" spc="-1" strike="noStrike">
-              <a:solidFill>
-                <a:srgbClr val="070707"/>
-              </a:solidFill>
-              <a:latin typeface="Arial"/>
-            </a:endParaRPr>
-          </a:p>
-        </p:txBody>
-      </p:sp>
-      <p:sp>
-        <p:nvSpPr>
-          <p:cNvPr id="109" name="TextShape 11"/>
-          <p:cNvSpPr txBox="1"/>
-          <p:nvPr/>
-        </p:nvSpPr>
-        <p:spPr>
-          <a:xfrm>
-            <a:off x="27957600" y="16808760"/>
-            <a:ext cx="9338400" cy="2415240"/>
-          </a:xfrm>
-          <a:prstGeom prst="rect">
-            <a:avLst/>
-          </a:prstGeom>
-          <a:noFill/>
-          <a:ln>
-            <a:noFill/>
-          </a:ln>
-        </p:spPr>
-        <p:txBody>
-          <a:bodyPr lIns="90000" rIns="90000" tIns="45000" bIns="45000"/>
-          <a:p>
-            <a:pPr marL="476280" indent="-475920" algn="just">
-              <a:lnSpc>
-                <a:spcPct val="100000"/>
-              </a:lnSpc>
-              <a:spcBef>
-                <a:spcPts val="799"/>
-              </a:spcBef>
-              <a:buClr>
-                <a:srgbClr val="070707"/>
-              </a:buClr>
-              <a:buFont typeface="Arial"/>
-              <a:buChar char="•"/>
-            </a:pPr>
-            <a:r>
-              <a:rPr b="0" lang="en-US" sz="3200" spc="-1" strike="noStrike">
-                <a:solidFill>
-                  <a:srgbClr val="070707"/>
-                </a:solidFill>
-                <a:latin typeface="Arial"/>
-              </a:rPr>
-              <a:t>We follow (Yarden et al., 2008) in proposing a form of Theory Learning by inducing a set of core facts and a set of logical rules. Our model can recover the following Taxonomy tree.</a:t>
-            </a:r>
-            <a:endParaRPr b="0" lang="en-US" sz="3200" spc="-1" strike="noStrike">
-              <a:solidFill>
-                <a:srgbClr val="070707"/>
-              </a:solidFill>
-              <a:latin typeface="Arial"/>
-            </a:endParaRPr>
-          </a:p>
-          <a:p>
-            <a:pPr marL="476280" indent="-475920">
-              <a:lnSpc>
-                <a:spcPct val="100000"/>
-              </a:lnSpc>
-              <a:spcBef>
-                <a:spcPts val="799"/>
-              </a:spcBef>
-              <a:buClr>
-                <a:srgbClr val="070707"/>
-              </a:buClr>
-              <a:buFont typeface="Arial"/>
-              <a:buChar char="•"/>
-            </a:pPr>
-            <a:endParaRPr b="0" lang="en-US" sz="3200" spc="-1" strike="noStrike">
+            <a:endParaRPr lang="en-US" sz="3200" b="0" strike="noStrike" spc="-1" dirty="0">
               <a:solidFill>
                 <a:srgbClr val="070707"/>
               </a:solidFill>
@@ -5506,22 +5484,25 @@
       </p:sp>
     </p:spTree>
   </p:cSld>
+  <p:clrMapOvr>
+    <a:masterClrMapping/>
+  </p:clrMapOvr>
   <p:timing>
     <p:tnLst>
       <p:par>
-        <p:cTn id="3" dur="indefinite" restart="never" nodeType="tmRoot">
+        <p:cTn xmlns:p14="http://schemas.microsoft.com/office/powerpoint/2010/main" id="1" dur="indefinite" restart="never" nodeType="tmRoot">
           <p:childTnLst>
             <p:seq>
-              <p:cTn id="4" dur="indefinite" nodeType="mainSeq"/>
+              <p:cTn id="2" dur="indefinite" nodeType="mainSeq"/>
               <p:prevCondLst>
-                <p:cond delay="0" evt="onPrev">
+                <p:cond evt="onPrev" delay="0">
                   <p:tgtEl>
                     <p:sldTgt/>
                   </p:tgtEl>
                 </p:cond>
               </p:prevCondLst>
               <p:nextCondLst>
-                <p:cond delay="0" evt="onNext">
+                <p:cond evt="onNext" delay="0">
                   <p:tgtEl>
                     <p:sldTgt/>
                   </p:tgtEl>
@@ -5550,28 +5531,28 @@
         <a:srgbClr val="000000"/>
       </a:dk2>
       <a:lt2>
-        <a:srgbClr val="0d2557"/>
+        <a:srgbClr val="0D2557"/>
       </a:lt2>
       <a:accent1>
-        <a:srgbClr val="558d96"/>
+        <a:srgbClr val="558D96"/>
       </a:accent1>
       <a:accent2>
-        <a:srgbClr val="c0504d"/>
+        <a:srgbClr val="C0504D"/>
       </a:accent2>
       <a:accent3>
-        <a:srgbClr val="9bbb59"/>
+        <a:srgbClr val="9BBB59"/>
       </a:accent3>
       <a:accent4>
-        <a:srgbClr val="8064a2"/>
+        <a:srgbClr val="8064A2"/>
       </a:accent4>
       <a:accent5>
-        <a:srgbClr val="4bacc6"/>
+        <a:srgbClr val="4BACC6"/>
       </a:accent5>
       <a:accent6>
-        <a:srgbClr val="f79646"/>
+        <a:srgbClr val="F79646"/>
       </a:accent6>
       <a:hlink>
-        <a:srgbClr val="0000ff"/>
+        <a:srgbClr val="0000FF"/>
       </a:hlink>
       <a:folHlink>
         <a:srgbClr val="800080"/>
@@ -5756,6 +5737,8 @@
       </a:bgFillStyleLst>
     </a:fmtScheme>
   </a:themeElements>
+  <a:objectDefaults/>
+  <a:extraClrSchemeLst/>
 </a:theme>
 </file>
 
@@ -5773,28 +5756,28 @@
         <a:srgbClr val="000000"/>
       </a:dk2>
       <a:lt2>
-        <a:srgbClr val="0d2557"/>
+        <a:srgbClr val="0D2557"/>
       </a:lt2>
       <a:accent1>
-        <a:srgbClr val="558d96"/>
+        <a:srgbClr val="558D96"/>
       </a:accent1>
       <a:accent2>
-        <a:srgbClr val="c0504d"/>
+        <a:srgbClr val="C0504D"/>
       </a:accent2>
       <a:accent3>
-        <a:srgbClr val="9bbb59"/>
+        <a:srgbClr val="9BBB59"/>
       </a:accent3>
       <a:accent4>
-        <a:srgbClr val="8064a2"/>
+        <a:srgbClr val="8064A2"/>
       </a:accent4>
       <a:accent5>
-        <a:srgbClr val="4bacc6"/>
+        <a:srgbClr val="4BACC6"/>
       </a:accent5>
       <a:accent6>
-        <a:srgbClr val="f79646"/>
+        <a:srgbClr val="F79646"/>
       </a:accent6>
       <a:hlink>
-        <a:srgbClr val="0000ff"/>
+        <a:srgbClr val="0000FF"/>
       </a:hlink>
       <a:folHlink>
         <a:srgbClr val="800080"/>
@@ -5979,5 +5962,7 @@
       </a:bgFillStyleLst>
     </a:fmtScheme>
   </a:themeElements>
+  <a:objectDefaults/>
+  <a:extraClrSchemeLst/>
 </a:theme>
 </file>
</xml_diff>